<commit_message>
Data analysis in jupyter notebook and made powerpoint
</commit_message>
<xml_diff>
--- a/Open Table Presentation.pptx
+++ b/Open Table Presentation.pptx
@@ -5,16 +5,28 @@
     <p:sldMasterId id="2147483684" r:id="rId1"/>
     <p:sldMasterId id="2147483696" r:id="rId2"/>
   </p:sldMasterIdLst>
+  <p:notesMasterIdLst>
+    <p:notesMasterId r:id="rId18"/>
+  </p:notesMasterIdLst>
+  <p:handoutMasterIdLst>
+    <p:handoutMasterId r:id="rId19"/>
+  </p:handoutMasterIdLst>
   <p:sldIdLst>
     <p:sldId id="256" r:id="rId3"/>
     <p:sldId id="257" r:id="rId4"/>
     <p:sldId id="258" r:id="rId5"/>
     <p:sldId id="259" r:id="rId6"/>
     <p:sldId id="260" r:id="rId7"/>
-    <p:sldId id="261" r:id="rId8"/>
-    <p:sldId id="262" r:id="rId9"/>
-    <p:sldId id="263" r:id="rId10"/>
-    <p:sldId id="264" r:id="rId11"/>
+    <p:sldId id="271" r:id="rId8"/>
+    <p:sldId id="266" r:id="rId9"/>
+    <p:sldId id="262" r:id="rId10"/>
+    <p:sldId id="267" r:id="rId11"/>
+    <p:sldId id="268" r:id="rId12"/>
+    <p:sldId id="269" r:id="rId13"/>
+    <p:sldId id="270" r:id="rId14"/>
+    <p:sldId id="263" r:id="rId15"/>
+    <p:sldId id="265" r:id="rId16"/>
+    <p:sldId id="264" r:id="rId17"/>
   </p:sldIdLst>
   <p:sldSz cx="12192000" cy="6858000"/>
   <p:notesSz cx="6858000" cy="9144000"/>
@@ -127,16 +139,760 @@
             <p14:sldId id="258"/>
             <p14:sldId id="259"/>
             <p14:sldId id="260"/>
-            <p14:sldId id="261"/>
+            <p14:sldId id="271"/>
+            <p14:sldId id="266"/>
             <p14:sldId id="262"/>
+            <p14:sldId id="267"/>
+            <p14:sldId id="268"/>
+            <p14:sldId id="269"/>
+            <p14:sldId id="270"/>
             <p14:sldId id="263"/>
+            <p14:sldId id="265"/>
             <p14:sldId id="264"/>
           </p14:sldIdLst>
         </p14:section>
       </p14:sectionLst>
     </p:ext>
+    <p:ext uri="{EFAFB233-063F-42B5-8137-9DF3F51BA10A}">
+      <p15:sldGuideLst xmlns:p15="http://schemas.microsoft.com/office/powerpoint/2012/main"/>
+    </p:ext>
+    <p:ext uri="{2D200454-40CA-4A62-9FC3-DE9A4176ACB9}">
+      <p15:notesGuideLst xmlns:p15="http://schemas.microsoft.com/office/powerpoint/2012/main"/>
+    </p:ext>
   </p:extLst>
 </p:presentation>
+</file>
+
+<file path=ppt/handoutMasters/handoutMaster1.xml><?xml version="1.0" encoding="utf-8"?>
+<p:handoutMaster xmlns:a="http://schemas.openxmlformats.org/drawingml/2006/main" xmlns:r="http://schemas.openxmlformats.org/officeDocument/2006/relationships" xmlns:p="http://schemas.openxmlformats.org/presentationml/2006/main">
+  <p:cSld>
+    <p:bg>
+      <p:bgRef idx="1001">
+        <a:schemeClr val="bg1"/>
+      </p:bgRef>
+    </p:bg>
+    <p:spTree>
+      <p:nvGrpSpPr>
+        <p:cNvPr id="1" name=""/>
+        <p:cNvGrpSpPr/>
+        <p:nvPr/>
+      </p:nvGrpSpPr>
+      <p:grpSpPr>
+        <a:xfrm>
+          <a:off x="0" y="0"/>
+          <a:ext cx="0" cy="0"/>
+          <a:chOff x="0" y="0"/>
+          <a:chExt cx="0" cy="0"/>
+        </a:xfrm>
+      </p:grpSpPr>
+      <p:sp>
+        <p:nvSpPr>
+          <p:cNvPr id="2" name="Header Placeholder 1">
+            <a:extLst>
+              <a:ext uri="{FF2B5EF4-FFF2-40B4-BE49-F238E27FC236}">
+                <a16:creationId xmlns:a16="http://schemas.microsoft.com/office/drawing/2014/main" id="{1F4044E6-2A02-3F40-AE59-3646060207E0}"/>
+              </a:ext>
+            </a:extLst>
+          </p:cNvPr>
+          <p:cNvSpPr>
+            <a:spLocks noGrp="1"/>
+          </p:cNvSpPr>
+          <p:nvPr>
+            <p:ph type="hdr" sz="quarter"/>
+          </p:nvPr>
+        </p:nvSpPr>
+        <p:spPr>
+          <a:xfrm>
+            <a:off x="0" y="0"/>
+            <a:ext cx="2971800" cy="458788"/>
+          </a:xfrm>
+          <a:prstGeom prst="rect">
+            <a:avLst/>
+          </a:prstGeom>
+        </p:spPr>
+        <p:txBody>
+          <a:bodyPr vert="horz" lIns="91440" tIns="45720" rIns="91440" bIns="45720" rtlCol="0"/>
+          <a:lstStyle>
+            <a:lvl1pPr algn="l">
+              <a:defRPr sz="1200"/>
+            </a:lvl1pPr>
+          </a:lstStyle>
+          <a:p>
+            <a:endParaRPr lang="en-US"/>
+          </a:p>
+        </p:txBody>
+      </p:sp>
+      <p:sp>
+        <p:nvSpPr>
+          <p:cNvPr id="3" name="Date Placeholder 2">
+            <a:extLst>
+              <a:ext uri="{FF2B5EF4-FFF2-40B4-BE49-F238E27FC236}">
+                <a16:creationId xmlns:a16="http://schemas.microsoft.com/office/drawing/2014/main" id="{1C74AFC7-FA89-1241-99A5-E66CAFB7C445}"/>
+              </a:ext>
+            </a:extLst>
+          </p:cNvPr>
+          <p:cNvSpPr>
+            <a:spLocks noGrp="1"/>
+          </p:cNvSpPr>
+          <p:nvPr>
+            <p:ph type="dt" sz="quarter" idx="1"/>
+          </p:nvPr>
+        </p:nvSpPr>
+        <p:spPr>
+          <a:xfrm>
+            <a:off x="3884613" y="0"/>
+            <a:ext cx="2971800" cy="458788"/>
+          </a:xfrm>
+          <a:prstGeom prst="rect">
+            <a:avLst/>
+          </a:prstGeom>
+        </p:spPr>
+        <p:txBody>
+          <a:bodyPr vert="horz" lIns="91440" tIns="45720" rIns="91440" bIns="45720" rtlCol="0"/>
+          <a:lstStyle>
+            <a:lvl1pPr algn="r">
+              <a:defRPr sz="1200"/>
+            </a:lvl1pPr>
+          </a:lstStyle>
+          <a:p>
+            <a:fld id="{3A508508-6965-CD4E-9AF5-DC8A497FA510}" type="datetimeFigureOut">
+              <a:rPr lang="en-US" smtClean="0"/>
+              <a:t>4/22/19</a:t>
+            </a:fld>
+            <a:endParaRPr lang="en-US"/>
+          </a:p>
+        </p:txBody>
+      </p:sp>
+      <p:sp>
+        <p:nvSpPr>
+          <p:cNvPr id="4" name="Footer Placeholder 3">
+            <a:extLst>
+              <a:ext uri="{FF2B5EF4-FFF2-40B4-BE49-F238E27FC236}">
+                <a16:creationId xmlns:a16="http://schemas.microsoft.com/office/drawing/2014/main" id="{4ADE1309-DCD1-A24F-B153-756959D23F43}"/>
+              </a:ext>
+            </a:extLst>
+          </p:cNvPr>
+          <p:cNvSpPr>
+            <a:spLocks noGrp="1"/>
+          </p:cNvSpPr>
+          <p:nvPr>
+            <p:ph type="ftr" sz="quarter" idx="2"/>
+          </p:nvPr>
+        </p:nvSpPr>
+        <p:spPr>
+          <a:xfrm>
+            <a:off x="0" y="8685213"/>
+            <a:ext cx="2971800" cy="458787"/>
+          </a:xfrm>
+          <a:prstGeom prst="rect">
+            <a:avLst/>
+          </a:prstGeom>
+        </p:spPr>
+        <p:txBody>
+          <a:bodyPr vert="horz" lIns="91440" tIns="45720" rIns="91440" bIns="45720" rtlCol="0" anchor="b"/>
+          <a:lstStyle>
+            <a:lvl1pPr algn="l">
+              <a:defRPr sz="1200"/>
+            </a:lvl1pPr>
+          </a:lstStyle>
+          <a:p>
+            <a:endParaRPr lang="en-US"/>
+          </a:p>
+        </p:txBody>
+      </p:sp>
+      <p:sp>
+        <p:nvSpPr>
+          <p:cNvPr id="5" name="Slide Number Placeholder 4">
+            <a:extLst>
+              <a:ext uri="{FF2B5EF4-FFF2-40B4-BE49-F238E27FC236}">
+                <a16:creationId xmlns:a16="http://schemas.microsoft.com/office/drawing/2014/main" id="{3D413518-E34C-0642-8648-3DD55E627ECE}"/>
+              </a:ext>
+            </a:extLst>
+          </p:cNvPr>
+          <p:cNvSpPr>
+            <a:spLocks noGrp="1"/>
+          </p:cNvSpPr>
+          <p:nvPr>
+            <p:ph type="sldNum" sz="quarter" idx="3"/>
+          </p:nvPr>
+        </p:nvSpPr>
+        <p:spPr>
+          <a:xfrm>
+            <a:off x="3884613" y="8685213"/>
+            <a:ext cx="2971800" cy="458787"/>
+          </a:xfrm>
+          <a:prstGeom prst="rect">
+            <a:avLst/>
+          </a:prstGeom>
+        </p:spPr>
+        <p:txBody>
+          <a:bodyPr vert="horz" lIns="91440" tIns="45720" rIns="91440" bIns="45720" rtlCol="0" anchor="b"/>
+          <a:lstStyle>
+            <a:lvl1pPr algn="r">
+              <a:defRPr sz="1200"/>
+            </a:lvl1pPr>
+          </a:lstStyle>
+          <a:p>
+            <a:fld id="{2E7B14F1-FCED-F149-89C1-63E3AFD59215}" type="slidenum">
+              <a:rPr lang="en-US" smtClean="0"/>
+              <a:t>‹#›</a:t>
+            </a:fld>
+            <a:endParaRPr lang="en-US"/>
+          </a:p>
+        </p:txBody>
+      </p:sp>
+    </p:spTree>
+    <p:extLst>
+      <p:ext uri="{BB962C8B-B14F-4D97-AF65-F5344CB8AC3E}">
+        <p14:creationId xmlns:p14="http://schemas.microsoft.com/office/powerpoint/2010/main" val="2362209930"/>
+      </p:ext>
+    </p:extLst>
+  </p:cSld>
+  <p:clrMap bg1="lt1" tx1="dk1" bg2="lt2" tx2="dk2" accent1="accent1" accent2="accent2" accent3="accent3" accent4="accent4" accent5="accent5" accent6="accent6" hlink="hlink" folHlink="folHlink"/>
+  <p:hf sldNum="0" ftr="0" dt="0"/>
+</p:handoutMaster>
+</file>
+
+<file path=ppt/notesMasters/notesMaster1.xml><?xml version="1.0" encoding="utf-8"?>
+<p:notesMaster xmlns:a="http://schemas.openxmlformats.org/drawingml/2006/main" xmlns:r="http://schemas.openxmlformats.org/officeDocument/2006/relationships" xmlns:p="http://schemas.openxmlformats.org/presentationml/2006/main">
+  <p:cSld>
+    <p:bg>
+      <p:bgRef idx="1001">
+        <a:schemeClr val="bg1"/>
+      </p:bgRef>
+    </p:bg>
+    <p:spTree>
+      <p:nvGrpSpPr>
+        <p:cNvPr id="1" name=""/>
+        <p:cNvGrpSpPr/>
+        <p:nvPr/>
+      </p:nvGrpSpPr>
+      <p:grpSpPr>
+        <a:xfrm>
+          <a:off x="0" y="0"/>
+          <a:ext cx="0" cy="0"/>
+          <a:chOff x="0" y="0"/>
+          <a:chExt cx="0" cy="0"/>
+        </a:xfrm>
+      </p:grpSpPr>
+      <p:sp>
+        <p:nvSpPr>
+          <p:cNvPr id="2" name="Header Placeholder 1"/>
+          <p:cNvSpPr>
+            <a:spLocks noGrp="1"/>
+          </p:cNvSpPr>
+          <p:nvPr>
+            <p:ph type="hdr" sz="quarter"/>
+          </p:nvPr>
+        </p:nvSpPr>
+        <p:spPr>
+          <a:xfrm>
+            <a:off x="0" y="0"/>
+            <a:ext cx="2971800" cy="458788"/>
+          </a:xfrm>
+          <a:prstGeom prst="rect">
+            <a:avLst/>
+          </a:prstGeom>
+        </p:spPr>
+        <p:txBody>
+          <a:bodyPr vert="horz" lIns="91440" tIns="45720" rIns="91440" bIns="45720" rtlCol="0"/>
+          <a:lstStyle>
+            <a:lvl1pPr algn="l">
+              <a:defRPr sz="1200"/>
+            </a:lvl1pPr>
+          </a:lstStyle>
+          <a:p>
+            <a:endParaRPr lang="en-US"/>
+          </a:p>
+        </p:txBody>
+      </p:sp>
+      <p:sp>
+        <p:nvSpPr>
+          <p:cNvPr id="3" name="Date Placeholder 2"/>
+          <p:cNvSpPr>
+            <a:spLocks noGrp="1"/>
+          </p:cNvSpPr>
+          <p:nvPr>
+            <p:ph type="dt" idx="1"/>
+          </p:nvPr>
+        </p:nvSpPr>
+        <p:spPr>
+          <a:xfrm>
+            <a:off x="3884613" y="0"/>
+            <a:ext cx="2971800" cy="458788"/>
+          </a:xfrm>
+          <a:prstGeom prst="rect">
+            <a:avLst/>
+          </a:prstGeom>
+        </p:spPr>
+        <p:txBody>
+          <a:bodyPr vert="horz" lIns="91440" tIns="45720" rIns="91440" bIns="45720" rtlCol="0"/>
+          <a:lstStyle>
+            <a:lvl1pPr algn="r">
+              <a:defRPr sz="1200"/>
+            </a:lvl1pPr>
+          </a:lstStyle>
+          <a:p>
+            <a:fld id="{9EA96EFE-B442-5E48-A009-E59084940F05}" type="datetimeFigureOut">
+              <a:rPr lang="en-US" smtClean="0"/>
+              <a:t>4/22/19</a:t>
+            </a:fld>
+            <a:endParaRPr lang="en-US"/>
+          </a:p>
+        </p:txBody>
+      </p:sp>
+      <p:sp>
+        <p:nvSpPr>
+          <p:cNvPr id="4" name="Slide Image Placeholder 3"/>
+          <p:cNvSpPr>
+            <a:spLocks noGrp="1" noRot="1" noChangeAspect="1"/>
+          </p:cNvSpPr>
+          <p:nvPr>
+            <p:ph type="sldImg" idx="2"/>
+          </p:nvPr>
+        </p:nvSpPr>
+        <p:spPr>
+          <a:xfrm>
+            <a:off x="685800" y="1143000"/>
+            <a:ext cx="5486400" cy="3086100"/>
+          </a:xfrm>
+          <a:prstGeom prst="rect">
+            <a:avLst/>
+          </a:prstGeom>
+          <a:noFill/>
+          <a:ln w="12700">
+            <a:solidFill>
+              <a:prstClr val="black"/>
+            </a:solidFill>
+          </a:ln>
+        </p:spPr>
+        <p:txBody>
+          <a:bodyPr vert="horz" lIns="91440" tIns="45720" rIns="91440" bIns="45720" rtlCol="0" anchor="ctr"/>
+          <a:lstStyle/>
+          <a:p>
+            <a:endParaRPr lang="en-US"/>
+          </a:p>
+        </p:txBody>
+      </p:sp>
+      <p:sp>
+        <p:nvSpPr>
+          <p:cNvPr id="5" name="Notes Placeholder 4"/>
+          <p:cNvSpPr>
+            <a:spLocks noGrp="1"/>
+          </p:cNvSpPr>
+          <p:nvPr>
+            <p:ph type="body" sz="quarter" idx="3"/>
+          </p:nvPr>
+        </p:nvSpPr>
+        <p:spPr>
+          <a:xfrm>
+            <a:off x="685800" y="4400550"/>
+            <a:ext cx="5486400" cy="3600450"/>
+          </a:xfrm>
+          <a:prstGeom prst="rect">
+            <a:avLst/>
+          </a:prstGeom>
+        </p:spPr>
+        <p:txBody>
+          <a:bodyPr vert="horz" lIns="91440" tIns="45720" rIns="91440" bIns="45720" rtlCol="0"/>
+          <a:lstStyle/>
+          <a:p>
+            <a:pPr lvl="0"/>
+            <a:r>
+              <a:rPr lang="en-US"/>
+              <a:t>Click to edit Master text styles</a:t>
+            </a:r>
+          </a:p>
+          <a:p>
+            <a:pPr lvl="1"/>
+            <a:r>
+              <a:rPr lang="en-US"/>
+              <a:t>Second level</a:t>
+            </a:r>
+          </a:p>
+          <a:p>
+            <a:pPr lvl="2"/>
+            <a:r>
+              <a:rPr lang="en-US"/>
+              <a:t>Third level</a:t>
+            </a:r>
+          </a:p>
+          <a:p>
+            <a:pPr lvl="3"/>
+            <a:r>
+              <a:rPr lang="en-US"/>
+              <a:t>Fourth level</a:t>
+            </a:r>
+          </a:p>
+          <a:p>
+            <a:pPr lvl="4"/>
+            <a:r>
+              <a:rPr lang="en-US"/>
+              <a:t>Fifth level</a:t>
+            </a:r>
+          </a:p>
+        </p:txBody>
+      </p:sp>
+      <p:sp>
+        <p:nvSpPr>
+          <p:cNvPr id="6" name="Footer Placeholder 5"/>
+          <p:cNvSpPr>
+            <a:spLocks noGrp="1"/>
+          </p:cNvSpPr>
+          <p:nvPr>
+            <p:ph type="ftr" sz="quarter" idx="4"/>
+          </p:nvPr>
+        </p:nvSpPr>
+        <p:spPr>
+          <a:xfrm>
+            <a:off x="0" y="8685213"/>
+            <a:ext cx="2971800" cy="458787"/>
+          </a:xfrm>
+          <a:prstGeom prst="rect">
+            <a:avLst/>
+          </a:prstGeom>
+        </p:spPr>
+        <p:txBody>
+          <a:bodyPr vert="horz" lIns="91440" tIns="45720" rIns="91440" bIns="45720" rtlCol="0" anchor="b"/>
+          <a:lstStyle>
+            <a:lvl1pPr algn="l">
+              <a:defRPr sz="1200"/>
+            </a:lvl1pPr>
+          </a:lstStyle>
+          <a:p>
+            <a:endParaRPr lang="en-US"/>
+          </a:p>
+        </p:txBody>
+      </p:sp>
+      <p:sp>
+        <p:nvSpPr>
+          <p:cNvPr id="7" name="Slide Number Placeholder 6"/>
+          <p:cNvSpPr>
+            <a:spLocks noGrp="1"/>
+          </p:cNvSpPr>
+          <p:nvPr>
+            <p:ph type="sldNum" sz="quarter" idx="5"/>
+          </p:nvPr>
+        </p:nvSpPr>
+        <p:spPr>
+          <a:xfrm>
+            <a:off x="3884613" y="8685213"/>
+            <a:ext cx="2971800" cy="458787"/>
+          </a:xfrm>
+          <a:prstGeom prst="rect">
+            <a:avLst/>
+          </a:prstGeom>
+        </p:spPr>
+        <p:txBody>
+          <a:bodyPr vert="horz" lIns="91440" tIns="45720" rIns="91440" bIns="45720" rtlCol="0" anchor="b"/>
+          <a:lstStyle>
+            <a:lvl1pPr algn="r">
+              <a:defRPr sz="1200"/>
+            </a:lvl1pPr>
+          </a:lstStyle>
+          <a:p>
+            <a:fld id="{25A1D4AB-A6EF-8345-AD39-F69DA84B23D0}" type="slidenum">
+              <a:rPr lang="en-US" smtClean="0"/>
+              <a:t>‹#›</a:t>
+            </a:fld>
+            <a:endParaRPr lang="en-US"/>
+          </a:p>
+        </p:txBody>
+      </p:sp>
+    </p:spTree>
+    <p:extLst>
+      <p:ext uri="{BB962C8B-B14F-4D97-AF65-F5344CB8AC3E}">
+        <p14:creationId xmlns:p14="http://schemas.microsoft.com/office/powerpoint/2010/main" val="2706945660"/>
+      </p:ext>
+    </p:extLst>
+  </p:cSld>
+  <p:clrMap bg1="lt1" tx1="dk1" bg2="lt2" tx2="dk2" accent1="accent1" accent2="accent2" accent3="accent3" accent4="accent4" accent5="accent5" accent6="accent6" hlink="hlink" folHlink="folHlink"/>
+  <p:hf sldNum="0" ftr="0" dt="0"/>
+  <p:notesStyle>
+    <a:lvl1pPr marL="0" algn="l" defTabSz="914400" rtl="0" eaLnBrk="1" latinLnBrk="0" hangingPunct="1">
+      <a:defRPr sz="1200" kern="1200">
+        <a:solidFill>
+          <a:schemeClr val="tx1"/>
+        </a:solidFill>
+        <a:latin typeface="+mn-lt"/>
+        <a:ea typeface="+mn-ea"/>
+        <a:cs typeface="+mn-cs"/>
+      </a:defRPr>
+    </a:lvl1pPr>
+    <a:lvl2pPr marL="457200" algn="l" defTabSz="914400" rtl="0" eaLnBrk="1" latinLnBrk="0" hangingPunct="1">
+      <a:defRPr sz="1200" kern="1200">
+        <a:solidFill>
+          <a:schemeClr val="tx1"/>
+        </a:solidFill>
+        <a:latin typeface="+mn-lt"/>
+        <a:ea typeface="+mn-ea"/>
+        <a:cs typeface="+mn-cs"/>
+      </a:defRPr>
+    </a:lvl2pPr>
+    <a:lvl3pPr marL="914400" algn="l" defTabSz="914400" rtl="0" eaLnBrk="1" latinLnBrk="0" hangingPunct="1">
+      <a:defRPr sz="1200" kern="1200">
+        <a:solidFill>
+          <a:schemeClr val="tx1"/>
+        </a:solidFill>
+        <a:latin typeface="+mn-lt"/>
+        <a:ea typeface="+mn-ea"/>
+        <a:cs typeface="+mn-cs"/>
+      </a:defRPr>
+    </a:lvl3pPr>
+    <a:lvl4pPr marL="1371600" algn="l" defTabSz="914400" rtl="0" eaLnBrk="1" latinLnBrk="0" hangingPunct="1">
+      <a:defRPr sz="1200" kern="1200">
+        <a:solidFill>
+          <a:schemeClr val="tx1"/>
+        </a:solidFill>
+        <a:latin typeface="+mn-lt"/>
+        <a:ea typeface="+mn-ea"/>
+        <a:cs typeface="+mn-cs"/>
+      </a:defRPr>
+    </a:lvl4pPr>
+    <a:lvl5pPr marL="1828800" algn="l" defTabSz="914400" rtl="0" eaLnBrk="1" latinLnBrk="0" hangingPunct="1">
+      <a:defRPr sz="1200" kern="1200">
+        <a:solidFill>
+          <a:schemeClr val="tx1"/>
+        </a:solidFill>
+        <a:latin typeface="+mn-lt"/>
+        <a:ea typeface="+mn-ea"/>
+        <a:cs typeface="+mn-cs"/>
+      </a:defRPr>
+    </a:lvl5pPr>
+    <a:lvl6pPr marL="2286000" algn="l" defTabSz="914400" rtl="0" eaLnBrk="1" latinLnBrk="0" hangingPunct="1">
+      <a:defRPr sz="1200" kern="1200">
+        <a:solidFill>
+          <a:schemeClr val="tx1"/>
+        </a:solidFill>
+        <a:latin typeface="+mn-lt"/>
+        <a:ea typeface="+mn-ea"/>
+        <a:cs typeface="+mn-cs"/>
+      </a:defRPr>
+    </a:lvl6pPr>
+    <a:lvl7pPr marL="2743200" algn="l" defTabSz="914400" rtl="0" eaLnBrk="1" latinLnBrk="0" hangingPunct="1">
+      <a:defRPr sz="1200" kern="1200">
+        <a:solidFill>
+          <a:schemeClr val="tx1"/>
+        </a:solidFill>
+        <a:latin typeface="+mn-lt"/>
+        <a:ea typeface="+mn-ea"/>
+        <a:cs typeface="+mn-cs"/>
+      </a:defRPr>
+    </a:lvl7pPr>
+    <a:lvl8pPr marL="3200400" algn="l" defTabSz="914400" rtl="0" eaLnBrk="1" latinLnBrk="0" hangingPunct="1">
+      <a:defRPr sz="1200" kern="1200">
+        <a:solidFill>
+          <a:schemeClr val="tx1"/>
+        </a:solidFill>
+        <a:latin typeface="+mn-lt"/>
+        <a:ea typeface="+mn-ea"/>
+        <a:cs typeface="+mn-cs"/>
+      </a:defRPr>
+    </a:lvl8pPr>
+    <a:lvl9pPr marL="3657600" algn="l" defTabSz="914400" rtl="0" eaLnBrk="1" latinLnBrk="0" hangingPunct="1">
+      <a:defRPr sz="1200" kern="1200">
+        <a:solidFill>
+          <a:schemeClr val="tx1"/>
+        </a:solidFill>
+        <a:latin typeface="+mn-lt"/>
+        <a:ea typeface="+mn-ea"/>
+        <a:cs typeface="+mn-cs"/>
+      </a:defRPr>
+    </a:lvl9pPr>
+  </p:notesStyle>
+</p:notesMaster>
+</file>
+
+<file path=ppt/notesSlides/notesSlide1.xml><?xml version="1.0" encoding="utf-8"?>
+<p:notes xmlns:a="http://schemas.openxmlformats.org/drawingml/2006/main" xmlns:r="http://schemas.openxmlformats.org/officeDocument/2006/relationships" xmlns:p="http://schemas.openxmlformats.org/presentationml/2006/main">
+  <p:cSld>
+    <p:spTree>
+      <p:nvGrpSpPr>
+        <p:cNvPr id="1" name=""/>
+        <p:cNvGrpSpPr/>
+        <p:nvPr/>
+      </p:nvGrpSpPr>
+      <p:grpSpPr>
+        <a:xfrm>
+          <a:off x="0" y="0"/>
+          <a:ext cx="0" cy="0"/>
+          <a:chOff x="0" y="0"/>
+          <a:chExt cx="0" cy="0"/>
+        </a:xfrm>
+      </p:grpSpPr>
+      <p:sp>
+        <p:nvSpPr>
+          <p:cNvPr id="2" name="Slide Image Placeholder 1"/>
+          <p:cNvSpPr>
+            <a:spLocks noGrp="1" noRot="1" noChangeAspect="1"/>
+          </p:cNvSpPr>
+          <p:nvPr>
+            <p:ph type="sldImg"/>
+          </p:nvPr>
+        </p:nvSpPr>
+        <p:spPr/>
+      </p:sp>
+      <p:sp>
+        <p:nvSpPr>
+          <p:cNvPr id="3" name="Notes Placeholder 2"/>
+          <p:cNvSpPr>
+            <a:spLocks noGrp="1"/>
+          </p:cNvSpPr>
+          <p:nvPr>
+            <p:ph type="body" idx="1"/>
+          </p:nvPr>
+        </p:nvSpPr>
+        <p:spPr/>
+        <p:txBody>
+          <a:bodyPr/>
+          <a:lstStyle/>
+          <a:p>
+            <a:pPr marL="0" marR="0" lvl="0" indent="0" algn="l" defTabSz="914400" rtl="0" eaLnBrk="1" fontAlgn="auto" latinLnBrk="0" hangingPunct="1">
+              <a:lnSpc>
+                <a:spcPct val="100000"/>
+              </a:lnSpc>
+              <a:spcBef>
+                <a:spcPts val="0"/>
+              </a:spcBef>
+              <a:spcAft>
+                <a:spcPts val="0"/>
+              </a:spcAft>
+              <a:buClrTx/>
+              <a:buSzTx/>
+              <a:buFontTx/>
+              <a:buNone/>
+              <a:tabLst/>
+              <a:defRPr/>
+            </a:pPr>
+            <a:r>
+              <a:rPr lang="en-US" dirty="0"/>
+              <a:t>Personal</a:t>
+            </a:r>
+          </a:p>
+          <a:p>
+            <a:pPr marL="0" marR="0" lvl="0" indent="0" algn="l" defTabSz="914400" rtl="0" eaLnBrk="1" fontAlgn="auto" latinLnBrk="0" hangingPunct="1">
+              <a:lnSpc>
+                <a:spcPct val="100000"/>
+              </a:lnSpc>
+              <a:spcBef>
+                <a:spcPts val="0"/>
+              </a:spcBef>
+              <a:spcAft>
+                <a:spcPts val="0"/>
+              </a:spcAft>
+              <a:buClrTx/>
+              <a:buSzTx/>
+              <a:buFontTx/>
+              <a:buNone/>
+              <a:tabLst/>
+              <a:defRPr/>
+            </a:pPr>
+            <a:r>
+              <a:rPr lang="en-US" dirty="0"/>
+              <a:t>NYC has a big food scene, and unlike other places in the US most of the restaurants aren’t chains, so you don’t know how it is. Where to eat? What type of food? How Expensive? Where to live? Where to show family around?</a:t>
+            </a:r>
+          </a:p>
+          <a:p>
+            <a:pPr marL="0" marR="0" lvl="0" indent="0" algn="l" defTabSz="914400" rtl="0" eaLnBrk="1" fontAlgn="auto" latinLnBrk="0" hangingPunct="1">
+              <a:lnSpc>
+                <a:spcPct val="100000"/>
+              </a:lnSpc>
+              <a:spcBef>
+                <a:spcPts val="0"/>
+              </a:spcBef>
+              <a:spcAft>
+                <a:spcPts val="0"/>
+              </a:spcAft>
+              <a:buClrTx/>
+              <a:buSzTx/>
+              <a:buFontTx/>
+              <a:buNone/>
+              <a:tabLst/>
+              <a:defRPr/>
+            </a:pPr>
+            <a:endParaRPr lang="en-US" dirty="0"/>
+          </a:p>
+          <a:p>
+            <a:pPr marL="0" marR="0" lvl="0" indent="0" algn="l" defTabSz="914400" rtl="0" eaLnBrk="1" fontAlgn="auto" latinLnBrk="0" hangingPunct="1">
+              <a:lnSpc>
+                <a:spcPct val="100000"/>
+              </a:lnSpc>
+              <a:spcBef>
+                <a:spcPts val="0"/>
+              </a:spcBef>
+              <a:spcAft>
+                <a:spcPts val="0"/>
+              </a:spcAft>
+              <a:buClrTx/>
+              <a:buSzTx/>
+              <a:buFontTx/>
+              <a:buNone/>
+              <a:tabLst/>
+              <a:defRPr/>
+            </a:pPr>
+            <a:r>
+              <a:rPr lang="en-US" dirty="0"/>
+              <a:t>Business</a:t>
+            </a:r>
+          </a:p>
+          <a:p>
+            <a:pPr marL="0" marR="0" lvl="0" indent="0" algn="l" defTabSz="914400" rtl="0" eaLnBrk="1" fontAlgn="auto" latinLnBrk="0" hangingPunct="1">
+              <a:lnSpc>
+                <a:spcPct val="100000"/>
+              </a:lnSpc>
+              <a:spcBef>
+                <a:spcPts val="0"/>
+              </a:spcBef>
+              <a:spcAft>
+                <a:spcPts val="0"/>
+              </a:spcAft>
+              <a:buClrTx/>
+              <a:buSzTx/>
+              <a:buFontTx/>
+              <a:buNone/>
+              <a:tabLst/>
+              <a:defRPr/>
+            </a:pPr>
+            <a:r>
+              <a:rPr lang="en-US" dirty="0"/>
+              <a:t>What’s the most popular cuisines? Which cuisines need more exposure? Which areas have low reviews, avoid those areas or expand those areas. Where do people want to live, drives rent prices because it’s more popular food area. Stores because people know people will come to eat there.</a:t>
+            </a:r>
+          </a:p>
+          <a:p>
+            <a:endParaRPr lang="en-US" dirty="0"/>
+          </a:p>
+        </p:txBody>
+      </p:sp>
+      <p:sp>
+        <p:nvSpPr>
+          <p:cNvPr id="4" name="Header Placeholder 3"/>
+          <p:cNvSpPr>
+            <a:spLocks noGrp="1"/>
+          </p:cNvSpPr>
+          <p:nvPr>
+            <p:ph type="hdr" sz="quarter"/>
+          </p:nvPr>
+        </p:nvSpPr>
+        <p:spPr/>
+        <p:txBody>
+          <a:bodyPr/>
+          <a:lstStyle/>
+          <a:p>
+            <a:endParaRPr lang="en-US"/>
+          </a:p>
+        </p:txBody>
+      </p:sp>
+    </p:spTree>
+    <p:extLst>
+      <p:ext uri="{BB962C8B-B14F-4D97-AF65-F5344CB8AC3E}">
+        <p14:creationId xmlns:p14="http://schemas.microsoft.com/office/powerpoint/2010/main" val="1792169789"/>
+      </p:ext>
+    </p:extLst>
+  </p:cSld>
+  <p:clrMapOvr>
+    <a:masterClrMapping/>
+  </p:clrMapOvr>
+</p:notes>
 </file>
 
 <file path=ppt/slideLayouts/slideLayout1.xml><?xml version="1.0" encoding="utf-8"?>
@@ -284,9 +1040,9 @@
           <a:bodyPr/>
           <a:lstStyle/>
           <a:p>
-            <a:fld id="{48A87A34-81AB-432B-8DAE-1953F412C126}" type="datetimeFigureOut">
+            <a:fld id="{1BA5880C-E1DE-2B4A-B28C-12D0B1748FB4}" type="datetime1">
               <a:rPr lang="en-US" smtClean="0"/>
-              <a:t>4/19/19</a:t>
+              <a:t>4/22/19</a:t>
             </a:fld>
             <a:endParaRPr lang="en-US" dirty="0"/>
           </a:p>
@@ -482,9 +1238,9 @@
           <a:bodyPr/>
           <a:lstStyle/>
           <a:p>
-            <a:fld id="{48A87A34-81AB-432B-8DAE-1953F412C126}" type="datetimeFigureOut">
+            <a:fld id="{EF27EF74-0D3E-E047-8FC4-B12B589A8721}" type="datetime1">
               <a:rPr lang="en-US" smtClean="0"/>
-              <a:t>4/19/19</a:t>
+              <a:t>4/22/19</a:t>
             </a:fld>
             <a:endParaRPr lang="en-US" dirty="0"/>
           </a:p>
@@ -690,9 +1446,9 @@
           <a:bodyPr/>
           <a:lstStyle/>
           <a:p>
-            <a:fld id="{48A87A34-81AB-432B-8DAE-1953F412C126}" type="datetimeFigureOut">
+            <a:fld id="{DB970993-7C99-EA4E-9908-A8CBBA28743B}" type="datetime1">
               <a:rPr lang="en-US" smtClean="0"/>
-              <a:t>4/19/19</a:t>
+              <a:t>4/22/19</a:t>
             </a:fld>
             <a:endParaRPr lang="en-US" dirty="0"/>
           </a:p>
@@ -902,9 +1658,9 @@
           <a:bodyPr/>
           <a:lstStyle/>
           <a:p>
-            <a:fld id="{48A87A34-81AB-432B-8DAE-1953F412C126}" type="datetimeFigureOut">
+            <a:fld id="{C78EB730-4FA1-1B4A-84E1-C7182174C6E1}" type="datetime1">
               <a:rPr lang="en-US" smtClean="0"/>
-              <a:t>4/19/19</a:t>
+              <a:t>4/22/19</a:t>
             </a:fld>
             <a:endParaRPr lang="en-US" dirty="0"/>
           </a:p>
@@ -1113,9 +1869,9 @@
           <a:bodyPr/>
           <a:lstStyle/>
           <a:p>
-            <a:fld id="{48A87A34-81AB-432B-8DAE-1953F412C126}" type="datetimeFigureOut">
+            <a:fld id="{F7B92AB4-6B83-D44F-99FE-A1197DBBF432}" type="datetime1">
               <a:rPr lang="en-US" smtClean="0"/>
-              <a:t>4/19/19</a:t>
+              <a:t>4/22/19</a:t>
             </a:fld>
             <a:endParaRPr lang="en-US" dirty="0"/>
           </a:p>
@@ -1392,9 +2148,9 @@
           <a:bodyPr/>
           <a:lstStyle/>
           <a:p>
-            <a:fld id="{48A87A34-81AB-432B-8DAE-1953F412C126}" type="datetimeFigureOut">
+            <a:fld id="{4930A9D9-9797-504C-B4B0-576D6C06DB2A}" type="datetime1">
               <a:rPr lang="en-US" smtClean="0"/>
-              <a:t>4/19/19</a:t>
+              <a:t>4/22/19</a:t>
             </a:fld>
             <a:endParaRPr lang="en-US" dirty="0"/>
           </a:p>
@@ -1660,9 +2416,9 @@
           <a:bodyPr/>
           <a:lstStyle/>
           <a:p>
-            <a:fld id="{48A87A34-81AB-432B-8DAE-1953F412C126}" type="datetimeFigureOut">
+            <a:fld id="{C11CEF4F-4CB1-5C42-879B-4AD598862FA8}" type="datetime1">
               <a:rPr lang="en-US" smtClean="0"/>
-              <a:t>4/19/19</a:t>
+              <a:t>4/22/19</a:t>
             </a:fld>
             <a:endParaRPr lang="en-US" dirty="0"/>
           </a:p>
@@ -2076,9 +2832,9 @@
           <a:bodyPr/>
           <a:lstStyle/>
           <a:p>
-            <a:fld id="{48A87A34-81AB-432B-8DAE-1953F412C126}" type="datetimeFigureOut">
+            <a:fld id="{BD959753-8C0E-8E42-92C5-94F6DC748B29}" type="datetime1">
               <a:rPr lang="en-US" smtClean="0"/>
-              <a:t>4/19/19</a:t>
+              <a:t>4/22/19</a:t>
             </a:fld>
             <a:endParaRPr lang="en-US" dirty="0"/>
           </a:p>
@@ -2225,9 +2981,9 @@
           <a:bodyPr/>
           <a:lstStyle/>
           <a:p>
-            <a:fld id="{48A87A34-81AB-432B-8DAE-1953F412C126}" type="datetimeFigureOut">
+            <a:fld id="{04F80774-49BC-8F43-9954-2DF20E5D2699}" type="datetime1">
               <a:rPr lang="en-US" smtClean="0"/>
-              <a:t>4/19/19</a:t>
+              <a:t>4/22/19</a:t>
             </a:fld>
             <a:endParaRPr lang="en-US" dirty="0"/>
           </a:p>
@@ -2351,9 +3107,9 @@
           <a:bodyPr/>
           <a:lstStyle/>
           <a:p>
-            <a:fld id="{48A87A34-81AB-432B-8DAE-1953F412C126}" type="datetimeFigureOut">
+            <a:fld id="{6E02D669-A634-264B-A49B-F107604C8726}" type="datetime1">
               <a:rPr lang="en-US" smtClean="0"/>
-              <a:t>4/19/19</a:t>
+              <a:t>4/22/19</a:t>
             </a:fld>
             <a:endParaRPr lang="en-US" dirty="0"/>
           </a:p>
@@ -2602,9 +3358,9 @@
           <a:bodyPr/>
           <a:lstStyle/>
           <a:p>
-            <a:fld id="{48A87A34-81AB-432B-8DAE-1953F412C126}" type="datetimeFigureOut">
+            <a:fld id="{D1B0DCB9-5FE0-2F47-BAA6-56E666FFEB2E}" type="datetime1">
               <a:rPr lang="en-US" smtClean="0"/>
-              <a:t>4/19/19</a:t>
+              <a:t>4/22/19</a:t>
             </a:fld>
             <a:endParaRPr lang="en-US" dirty="0"/>
           </a:p>
@@ -2819,9 +3575,9 @@
           <a:bodyPr/>
           <a:lstStyle/>
           <a:p>
-            <a:fld id="{48A87A34-81AB-432B-8DAE-1953F412C126}" type="datetimeFigureOut">
+            <a:fld id="{7ED0A040-896E-7C42-932D-01F608B68C68}" type="datetime1">
               <a:rPr lang="en-US" smtClean="0"/>
-              <a:t>4/19/19</a:t>
+              <a:t>4/22/19</a:t>
             </a:fld>
             <a:endParaRPr lang="en-US" dirty="0"/>
           </a:p>
@@ -3245,10 +4001,9 @@
             </a:lvl1pPr>
           </a:lstStyle>
           <a:p>
-            <a:fld id="{48A87A34-81AB-432B-8DAE-1953F412C126}" type="datetimeFigureOut">
+            <a:fld id="{B51419A2-9E30-B443-9FA4-0894FDFC0D9A}" type="datetime1">
               <a:rPr lang="en-US" smtClean="0"/>
-              <a:pPr/>
-              <a:t>4/19/19</a:t>
+              <a:t>4/22/19</a:t>
             </a:fld>
             <a:endParaRPr lang="en-US" dirty="0"/>
           </a:p>
@@ -3452,9 +4207,9 @@
           <a:bodyPr/>
           <a:lstStyle/>
           <a:p>
-            <a:fld id="{48A87A34-81AB-432B-8DAE-1953F412C126}" type="datetimeFigureOut">
+            <a:fld id="{3C0D503F-0F64-1B45-9FCD-848FC8FEDDAC}" type="datetime1">
               <a:rPr lang="en-US" smtClean="0"/>
-              <a:t>4/19/19</a:t>
+              <a:t>4/22/19</a:t>
             </a:fld>
             <a:endParaRPr lang="en-US" dirty="0"/>
           </a:p>
@@ -3667,9 +4422,9 @@
           <a:bodyPr/>
           <a:lstStyle/>
           <a:p>
-            <a:fld id="{48A87A34-81AB-432B-8DAE-1953F412C126}" type="datetimeFigureOut">
+            <a:fld id="{102255CA-30AE-794D-A7DE-DA5486DD17C6}" type="datetime1">
               <a:rPr lang="en-US" smtClean="0"/>
-              <a:t>4/19/19</a:t>
+              <a:t>4/22/19</a:t>
             </a:fld>
             <a:endParaRPr lang="en-US" dirty="0"/>
           </a:p>
@@ -3961,9 +4716,9 @@
           <a:bodyPr/>
           <a:lstStyle/>
           <a:p>
-            <a:fld id="{48A87A34-81AB-432B-8DAE-1953F412C126}" type="datetimeFigureOut">
+            <a:fld id="{71728CC1-58E2-D746-A1C5-6F3841F6E07C}" type="datetime1">
               <a:rPr lang="en-US" smtClean="0"/>
-              <a:t>4/19/19</a:t>
+              <a:t>4/22/19</a:t>
             </a:fld>
             <a:endParaRPr lang="en-US" dirty="0"/>
           </a:p>
@@ -4226,9 +4981,9 @@
           <a:bodyPr/>
           <a:lstStyle/>
           <a:p>
-            <a:fld id="{48A87A34-81AB-432B-8DAE-1953F412C126}" type="datetimeFigureOut">
+            <a:fld id="{07DF0D9E-9F0C-5240-BA0A-98C634C70C67}" type="datetime1">
               <a:rPr lang="en-US" smtClean="0"/>
-              <a:t>4/19/19</a:t>
+              <a:t>4/22/19</a:t>
             </a:fld>
             <a:endParaRPr lang="en-US" dirty="0"/>
           </a:p>
@@ -4638,9 +5393,9 @@
           <a:bodyPr/>
           <a:lstStyle/>
           <a:p>
-            <a:fld id="{48A87A34-81AB-432B-8DAE-1953F412C126}" type="datetimeFigureOut">
+            <a:fld id="{52DA76EE-FAC1-9246-94B3-8D5C7D15713B}" type="datetime1">
               <a:rPr lang="en-US" smtClean="0"/>
-              <a:t>4/19/19</a:t>
+              <a:t>4/22/19</a:t>
             </a:fld>
             <a:endParaRPr lang="en-US" dirty="0"/>
           </a:p>
@@ -4779,9 +5534,9 @@
           <a:bodyPr/>
           <a:lstStyle/>
           <a:p>
-            <a:fld id="{48A87A34-81AB-432B-8DAE-1953F412C126}" type="datetimeFigureOut">
+            <a:fld id="{17F9B9E0-1E42-2A4C-87AA-7B9F8033EA0F}" type="datetime1">
               <a:rPr lang="en-US" smtClean="0"/>
-              <a:t>4/19/19</a:t>
+              <a:t>4/22/19</a:t>
             </a:fld>
             <a:endParaRPr lang="en-US" dirty="0"/>
           </a:p>
@@ -4892,9 +5647,9 @@
           <a:bodyPr/>
           <a:lstStyle/>
           <a:p>
-            <a:fld id="{48A87A34-81AB-432B-8DAE-1953F412C126}" type="datetimeFigureOut">
+            <a:fld id="{98D4B717-600D-D54B-A284-6654DB1B3778}" type="datetime1">
               <a:rPr lang="en-US" smtClean="0"/>
-              <a:t>4/19/19</a:t>
+              <a:t>4/22/19</a:t>
             </a:fld>
             <a:endParaRPr lang="en-US" dirty="0"/>
           </a:p>
@@ -5203,9 +5958,9 @@
           <a:bodyPr/>
           <a:lstStyle/>
           <a:p>
-            <a:fld id="{48A87A34-81AB-432B-8DAE-1953F412C126}" type="datetimeFigureOut">
+            <a:fld id="{167DCBE5-397A-4749-805A-7794C8DFC5AF}" type="datetime1">
               <a:rPr lang="en-US" smtClean="0"/>
-              <a:t>4/19/19</a:t>
+              <a:t>4/22/19</a:t>
             </a:fld>
             <a:endParaRPr lang="en-US" dirty="0"/>
           </a:p>
@@ -5491,10 +6246,9 @@
           <a:bodyPr/>
           <a:lstStyle/>
           <a:p>
-            <a:fld id="{48A87A34-81AB-432B-8DAE-1953F412C126}" type="datetimeFigureOut">
+            <a:fld id="{FB8B5BC8-9AA1-B941-ABF5-C52E3E8BC6D3}" type="datetime1">
               <a:rPr lang="en-US" smtClean="0"/>
-              <a:pPr/>
-              <a:t>4/19/19</a:t>
+              <a:t>4/22/19</a:t>
             </a:fld>
             <a:endParaRPr lang="en-US" dirty="0"/>
           </a:p>
@@ -5733,10 +6487,9 @@
             </a:lvl1pPr>
           </a:lstStyle>
           <a:p>
-            <a:fld id="{48A87A34-81AB-432B-8DAE-1953F412C126}" type="datetimeFigureOut">
+            <a:fld id="{2FAFAE3E-4BD9-084E-93CA-E6F8E4299F91}" type="datetime1">
               <a:rPr lang="en-US" smtClean="0"/>
-              <a:pPr/>
-              <a:t>4/19/19</a:t>
+              <a:t>4/22/19</a:t>
             </a:fld>
             <a:endParaRPr lang="en-US" dirty="0"/>
           </a:p>
@@ -5854,6 +6607,7 @@
     <p:sldLayoutId id="2147483694" r:id="rId10"/>
     <p:sldLayoutId id="2147483695" r:id="rId11"/>
   </p:sldLayoutIdLst>
+  <p:hf sldNum="0" hdr="0" ftr="0" dt="0"/>
   <p:txStyles>
     <p:titleStyle>
       <a:lvl1pPr algn="l" defTabSz="914400" rtl="0" eaLnBrk="1" latinLnBrk="0" hangingPunct="1">
@@ -6297,38 +7051,37 @@
           <a:p>
             <a:pPr lvl="0"/>
             <a:r>
-              <a:rPr lang="en-US"/>
+              <a:rPr lang="en-US" dirty="0"/>
               <a:t>Click to edit Master text styles</a:t>
             </a:r>
           </a:p>
           <a:p>
             <a:pPr lvl="1"/>
             <a:r>
-              <a:rPr lang="en-US"/>
+              <a:rPr lang="en-US" dirty="0"/>
               <a:t>Second level</a:t>
             </a:r>
           </a:p>
           <a:p>
             <a:pPr lvl="2"/>
             <a:r>
-              <a:rPr lang="en-US"/>
+              <a:rPr lang="en-US" dirty="0"/>
               <a:t>Third level</a:t>
             </a:r>
           </a:p>
           <a:p>
             <a:pPr lvl="3"/>
             <a:r>
-              <a:rPr lang="en-US"/>
+              <a:rPr lang="en-US" dirty="0"/>
               <a:t>Fourth level</a:t>
             </a:r>
           </a:p>
           <a:p>
             <a:pPr lvl="4"/>
             <a:r>
-              <a:rPr lang="en-US"/>
+              <a:rPr lang="en-US" dirty="0"/>
               <a:t>Fifth level</a:t>
             </a:r>
-            <a:endParaRPr lang="en-US" dirty="0"/>
           </a:p>
         </p:txBody>
       </p:sp>
@@ -6365,10 +7118,9 @@
             </a:lvl1pPr>
           </a:lstStyle>
           <a:p>
-            <a:fld id="{48A87A34-81AB-432B-8DAE-1953F412C126}" type="datetimeFigureOut">
+            <a:fld id="{2D67E6D0-CFC1-1448-88B9-E89E07E7B353}" type="datetime1">
               <a:rPr lang="en-US" smtClean="0"/>
-              <a:pPr/>
-              <a:t>4/19/19</a:t>
+              <a:t>4/22/19</a:t>
             </a:fld>
             <a:endParaRPr lang="en-US" dirty="0"/>
           </a:p>
@@ -6509,6 +7261,7 @@
     <p:sldLayoutId id="2147483706" r:id="rId10"/>
     <p:sldLayoutId id="2147483707" r:id="rId11"/>
   </p:sldLayoutIdLst>
+  <p:hf sldNum="0" hdr="0" ftr="0" dt="0"/>
   <p:txStyles>
     <p:titleStyle>
       <a:lvl1pPr algn="l" defTabSz="914400" rtl="0" eaLnBrk="1" latinLnBrk="0" hangingPunct="1">
@@ -6934,10 +7687,596 @@
           </a:p>
         </p:txBody>
       </p:sp>
+      <p:sp>
+        <p:nvSpPr>
+          <p:cNvPr id="2" name="TextBox 1">
+            <a:extLst>
+              <a:ext uri="{FF2B5EF4-FFF2-40B4-BE49-F238E27FC236}">
+                <a16:creationId xmlns:a16="http://schemas.microsoft.com/office/drawing/2014/main" id="{8E3F8157-1231-324D-A8B4-632BCF99A796}"/>
+              </a:ext>
+            </a:extLst>
+          </p:cNvPr>
+          <p:cNvSpPr txBox="1"/>
+          <p:nvPr/>
+        </p:nvSpPr>
+        <p:spPr>
+          <a:xfrm>
+            <a:off x="3778623" y="3478703"/>
+            <a:ext cx="5728447" cy="523220"/>
+          </a:xfrm>
+          <a:prstGeom prst="rect">
+            <a:avLst/>
+          </a:prstGeom>
+          <a:noFill/>
+        </p:spPr>
+        <p:txBody>
+          <a:bodyPr wrap="square" rtlCol="0">
+            <a:spAutoFit/>
+          </a:bodyPr>
+          <a:lstStyle/>
+          <a:p>
+            <a:r>
+              <a:rPr lang="en-US" sz="2800" dirty="0">
+                <a:solidFill>
+                  <a:srgbClr val="FF0000"/>
+                </a:solidFill>
+              </a:rPr>
+              <a:t>Where is the best place to eat in NYC?</a:t>
+            </a:r>
+          </a:p>
+        </p:txBody>
+      </p:sp>
     </p:spTree>
     <p:extLst>
       <p:ext uri="{BB962C8B-B14F-4D97-AF65-F5344CB8AC3E}">
         <p14:creationId xmlns:p14="http://schemas.microsoft.com/office/powerpoint/2010/main" val="102484871"/>
+      </p:ext>
+    </p:extLst>
+  </p:cSld>
+  <p:clrMapOvr>
+    <a:masterClrMapping/>
+  </p:clrMapOvr>
+</p:sld>
+</file>
+
+<file path=ppt/slides/slide10.xml><?xml version="1.0" encoding="utf-8"?>
+<p:sld xmlns:a="http://schemas.openxmlformats.org/drawingml/2006/main" xmlns:r="http://schemas.openxmlformats.org/officeDocument/2006/relationships" xmlns:p="http://schemas.openxmlformats.org/presentationml/2006/main">
+  <p:cSld>
+    <p:spTree>
+      <p:nvGrpSpPr>
+        <p:cNvPr id="1" name=""/>
+        <p:cNvGrpSpPr/>
+        <p:nvPr/>
+      </p:nvGrpSpPr>
+      <p:grpSpPr>
+        <a:xfrm>
+          <a:off x="0" y="0"/>
+          <a:ext cx="0" cy="0"/>
+          <a:chOff x="0" y="0"/>
+          <a:chExt cx="0" cy="0"/>
+        </a:xfrm>
+      </p:grpSpPr>
+      <p:pic>
+        <p:nvPicPr>
+          <p:cNvPr id="4" name="Picture 3">
+            <a:extLst>
+              <a:ext uri="{FF2B5EF4-FFF2-40B4-BE49-F238E27FC236}">
+                <a16:creationId xmlns:a16="http://schemas.microsoft.com/office/drawing/2014/main" id="{00A985BF-9466-8946-AC4D-C0C1C66CAAAE}"/>
+              </a:ext>
+            </a:extLst>
+          </p:cNvPr>
+          <p:cNvPicPr>
+            <a:picLocks noChangeAspect="1"/>
+          </p:cNvPicPr>
+          <p:nvPr/>
+        </p:nvPicPr>
+        <p:blipFill>
+          <a:blip r:embed="rId2"/>
+          <a:stretch>
+            <a:fillRect/>
+          </a:stretch>
+        </p:blipFill>
+        <p:spPr>
+          <a:xfrm>
+            <a:off x="2010709" y="146424"/>
+            <a:ext cx="8170582" cy="5836130"/>
+          </a:xfrm>
+          <a:prstGeom prst="rect">
+            <a:avLst/>
+          </a:prstGeom>
+        </p:spPr>
+      </p:pic>
+      <p:sp>
+        <p:nvSpPr>
+          <p:cNvPr id="3" name="Rectangle 2">
+            <a:extLst>
+              <a:ext uri="{FF2B5EF4-FFF2-40B4-BE49-F238E27FC236}">
+                <a16:creationId xmlns:a16="http://schemas.microsoft.com/office/drawing/2014/main" id="{B874810D-32A7-6B4E-9F59-19CD8D90DA68}"/>
+              </a:ext>
+            </a:extLst>
+          </p:cNvPr>
+          <p:cNvSpPr/>
+          <p:nvPr/>
+        </p:nvSpPr>
+        <p:spPr>
+          <a:xfrm>
+            <a:off x="8849565" y="506114"/>
+            <a:ext cx="1170705" cy="369332"/>
+          </a:xfrm>
+          <a:prstGeom prst="rect">
+            <a:avLst/>
+          </a:prstGeom>
+        </p:spPr>
+        <p:txBody>
+          <a:bodyPr wrap="none">
+            <a:spAutoFit/>
+          </a:bodyPr>
+          <a:lstStyle/>
+          <a:p>
+            <a:r>
+              <a:rPr lang="en-US" dirty="0">
+                <a:hlinkClick r:id="rId3"/>
+              </a:rPr>
+              <a:t>Interactive</a:t>
+            </a:r>
+            <a:endParaRPr lang="en-US" dirty="0"/>
+          </a:p>
+        </p:txBody>
+      </p:sp>
+    </p:spTree>
+    <p:extLst>
+      <p:ext uri="{BB962C8B-B14F-4D97-AF65-F5344CB8AC3E}">
+        <p14:creationId xmlns:p14="http://schemas.microsoft.com/office/powerpoint/2010/main" val="2854257229"/>
+      </p:ext>
+    </p:extLst>
+  </p:cSld>
+  <p:clrMapOvr>
+    <a:masterClrMapping/>
+  </p:clrMapOvr>
+</p:sld>
+</file>
+
+<file path=ppt/slides/slide11.xml><?xml version="1.0" encoding="utf-8"?>
+<p:sld xmlns:a="http://schemas.openxmlformats.org/drawingml/2006/main" xmlns:r="http://schemas.openxmlformats.org/officeDocument/2006/relationships" xmlns:p="http://schemas.openxmlformats.org/presentationml/2006/main">
+  <p:cSld>
+    <p:spTree>
+      <p:nvGrpSpPr>
+        <p:cNvPr id="1" name=""/>
+        <p:cNvGrpSpPr/>
+        <p:nvPr/>
+      </p:nvGrpSpPr>
+      <p:grpSpPr>
+        <a:xfrm>
+          <a:off x="0" y="0"/>
+          <a:ext cx="0" cy="0"/>
+          <a:chOff x="0" y="0"/>
+          <a:chExt cx="0" cy="0"/>
+        </a:xfrm>
+      </p:grpSpPr>
+      <p:pic>
+        <p:nvPicPr>
+          <p:cNvPr id="5" name="Picture 4">
+            <a:extLst>
+              <a:ext uri="{FF2B5EF4-FFF2-40B4-BE49-F238E27FC236}">
+                <a16:creationId xmlns:a16="http://schemas.microsoft.com/office/drawing/2014/main" id="{11B30E9F-5235-EA49-ABFF-D9F7A951ABEB}"/>
+              </a:ext>
+            </a:extLst>
+          </p:cNvPr>
+          <p:cNvPicPr>
+            <a:picLocks noChangeAspect="1"/>
+          </p:cNvPicPr>
+          <p:nvPr/>
+        </p:nvPicPr>
+        <p:blipFill>
+          <a:blip r:embed="rId2"/>
+          <a:stretch>
+            <a:fillRect/>
+          </a:stretch>
+        </p:blipFill>
+        <p:spPr>
+          <a:xfrm>
+            <a:off x="2089523" y="173318"/>
+            <a:ext cx="8012953" cy="5723538"/>
+          </a:xfrm>
+          <a:prstGeom prst="rect">
+            <a:avLst/>
+          </a:prstGeom>
+        </p:spPr>
+      </p:pic>
+      <p:sp>
+        <p:nvSpPr>
+          <p:cNvPr id="3" name="Rectangle 2">
+            <a:extLst>
+              <a:ext uri="{FF2B5EF4-FFF2-40B4-BE49-F238E27FC236}">
+                <a16:creationId xmlns:a16="http://schemas.microsoft.com/office/drawing/2014/main" id="{B874810D-32A7-6B4E-9F59-19CD8D90DA68}"/>
+              </a:ext>
+            </a:extLst>
+          </p:cNvPr>
+          <p:cNvSpPr/>
+          <p:nvPr/>
+        </p:nvSpPr>
+        <p:spPr>
+          <a:xfrm>
+            <a:off x="8849565" y="506114"/>
+            <a:ext cx="1170705" cy="369332"/>
+          </a:xfrm>
+          <a:prstGeom prst="rect">
+            <a:avLst/>
+          </a:prstGeom>
+        </p:spPr>
+        <p:txBody>
+          <a:bodyPr wrap="none">
+            <a:spAutoFit/>
+          </a:bodyPr>
+          <a:lstStyle/>
+          <a:p>
+            <a:r>
+              <a:rPr lang="en-US" dirty="0">
+                <a:hlinkClick r:id="rId3"/>
+              </a:rPr>
+              <a:t>Interactive</a:t>
+            </a:r>
+            <a:endParaRPr lang="en-US" dirty="0"/>
+          </a:p>
+        </p:txBody>
+      </p:sp>
+    </p:spTree>
+    <p:extLst>
+      <p:ext uri="{BB962C8B-B14F-4D97-AF65-F5344CB8AC3E}">
+        <p14:creationId xmlns:p14="http://schemas.microsoft.com/office/powerpoint/2010/main" val="2744370900"/>
+      </p:ext>
+    </p:extLst>
+  </p:cSld>
+  <p:clrMapOvr>
+    <a:masterClrMapping/>
+  </p:clrMapOvr>
+</p:sld>
+</file>
+
+<file path=ppt/slides/slide12.xml><?xml version="1.0" encoding="utf-8"?>
+<p:sld xmlns:a="http://schemas.openxmlformats.org/drawingml/2006/main" xmlns:r="http://schemas.openxmlformats.org/officeDocument/2006/relationships" xmlns:p="http://schemas.openxmlformats.org/presentationml/2006/main">
+  <p:cSld>
+    <p:spTree>
+      <p:nvGrpSpPr>
+        <p:cNvPr id="1" name=""/>
+        <p:cNvGrpSpPr/>
+        <p:nvPr/>
+      </p:nvGrpSpPr>
+      <p:grpSpPr>
+        <a:xfrm>
+          <a:off x="0" y="0"/>
+          <a:ext cx="0" cy="0"/>
+          <a:chOff x="0" y="0"/>
+          <a:chExt cx="0" cy="0"/>
+        </a:xfrm>
+      </p:grpSpPr>
+      <p:pic>
+        <p:nvPicPr>
+          <p:cNvPr id="4" name="Picture 3">
+            <a:extLst>
+              <a:ext uri="{FF2B5EF4-FFF2-40B4-BE49-F238E27FC236}">
+                <a16:creationId xmlns:a16="http://schemas.microsoft.com/office/drawing/2014/main" id="{AA135902-E009-154F-B399-82920793A6F3}"/>
+              </a:ext>
+            </a:extLst>
+          </p:cNvPr>
+          <p:cNvPicPr>
+            <a:picLocks noChangeAspect="1"/>
+          </p:cNvPicPr>
+          <p:nvPr/>
+        </p:nvPicPr>
+        <p:blipFill>
+          <a:blip r:embed="rId2"/>
+          <a:stretch>
+            <a:fillRect/>
+          </a:stretch>
+        </p:blipFill>
+        <p:spPr>
+          <a:xfrm>
+            <a:off x="1205753" y="107576"/>
+            <a:ext cx="9780494" cy="5868296"/>
+          </a:xfrm>
+          <a:prstGeom prst="rect">
+            <a:avLst/>
+          </a:prstGeom>
+        </p:spPr>
+      </p:pic>
+      <p:sp>
+        <p:nvSpPr>
+          <p:cNvPr id="3" name="Rectangle 2">
+            <a:extLst>
+              <a:ext uri="{FF2B5EF4-FFF2-40B4-BE49-F238E27FC236}">
+                <a16:creationId xmlns:a16="http://schemas.microsoft.com/office/drawing/2014/main" id="{B874810D-32A7-6B4E-9F59-19CD8D90DA68}"/>
+              </a:ext>
+            </a:extLst>
+          </p:cNvPr>
+          <p:cNvSpPr/>
+          <p:nvPr/>
+        </p:nvSpPr>
+        <p:spPr>
+          <a:xfrm>
+            <a:off x="8849565" y="506114"/>
+            <a:ext cx="1170705" cy="369332"/>
+          </a:xfrm>
+          <a:prstGeom prst="rect">
+            <a:avLst/>
+          </a:prstGeom>
+        </p:spPr>
+        <p:txBody>
+          <a:bodyPr wrap="none">
+            <a:spAutoFit/>
+          </a:bodyPr>
+          <a:lstStyle/>
+          <a:p>
+            <a:r>
+              <a:rPr lang="en-US" dirty="0">
+                <a:hlinkClick r:id="rId3"/>
+              </a:rPr>
+              <a:t>Interactive</a:t>
+            </a:r>
+            <a:endParaRPr lang="en-US" dirty="0"/>
+          </a:p>
+        </p:txBody>
+      </p:sp>
+    </p:spTree>
+    <p:extLst>
+      <p:ext uri="{BB962C8B-B14F-4D97-AF65-F5344CB8AC3E}">
+        <p14:creationId xmlns:p14="http://schemas.microsoft.com/office/powerpoint/2010/main" val="2976036502"/>
+      </p:ext>
+    </p:extLst>
+  </p:cSld>
+  <p:clrMapOvr>
+    <a:masterClrMapping/>
+  </p:clrMapOvr>
+</p:sld>
+</file>
+
+<file path=ppt/slides/slide13.xml><?xml version="1.0" encoding="utf-8"?>
+<p:sld xmlns:a="http://schemas.openxmlformats.org/drawingml/2006/main" xmlns:r="http://schemas.openxmlformats.org/officeDocument/2006/relationships" xmlns:p="http://schemas.openxmlformats.org/presentationml/2006/main">
+  <p:cSld>
+    <p:spTree>
+      <p:nvGrpSpPr>
+        <p:cNvPr id="1" name=""/>
+        <p:cNvGrpSpPr/>
+        <p:nvPr/>
+      </p:nvGrpSpPr>
+      <p:grpSpPr>
+        <a:xfrm>
+          <a:off x="0" y="0"/>
+          <a:ext cx="0" cy="0"/>
+          <a:chOff x="0" y="0"/>
+          <a:chExt cx="0" cy="0"/>
+        </a:xfrm>
+      </p:grpSpPr>
+      <p:sp>
+        <p:nvSpPr>
+          <p:cNvPr id="2" name="Title 1">
+            <a:extLst>
+              <a:ext uri="{FF2B5EF4-FFF2-40B4-BE49-F238E27FC236}">
+                <a16:creationId xmlns:a16="http://schemas.microsoft.com/office/drawing/2014/main" id="{4A89F021-91FD-0542-A098-2B10CDB39E34}"/>
+              </a:ext>
+            </a:extLst>
+          </p:cNvPr>
+          <p:cNvSpPr>
+            <a:spLocks noGrp="1"/>
+          </p:cNvSpPr>
+          <p:nvPr>
+            <p:ph type="title"/>
+          </p:nvPr>
+        </p:nvSpPr>
+        <p:spPr/>
+        <p:txBody>
+          <a:bodyPr>
+            <a:normAutofit/>
+          </a:bodyPr>
+          <a:lstStyle/>
+          <a:p>
+            <a:r>
+              <a:rPr lang="en-US" sz="4400" dirty="0"/>
+              <a:t>Future Work</a:t>
+            </a:r>
+          </a:p>
+        </p:txBody>
+      </p:sp>
+      <p:sp>
+        <p:nvSpPr>
+          <p:cNvPr id="3" name="Content Placeholder 2">
+            <a:extLst>
+              <a:ext uri="{FF2B5EF4-FFF2-40B4-BE49-F238E27FC236}">
+                <a16:creationId xmlns:a16="http://schemas.microsoft.com/office/drawing/2014/main" id="{29BC6EB3-4770-494A-B0F5-EEF7D75DEDD9}"/>
+              </a:ext>
+            </a:extLst>
+          </p:cNvPr>
+          <p:cNvSpPr>
+            <a:spLocks noGrp="1"/>
+          </p:cNvSpPr>
+          <p:nvPr>
+            <p:ph idx="1"/>
+          </p:nvPr>
+        </p:nvSpPr>
+        <p:spPr/>
+        <p:txBody>
+          <a:bodyPr/>
+          <a:lstStyle/>
+          <a:p>
+            <a:endParaRPr lang="en-US" dirty="0"/>
+          </a:p>
+        </p:txBody>
+      </p:sp>
+    </p:spTree>
+    <p:extLst>
+      <p:ext uri="{BB962C8B-B14F-4D97-AF65-F5344CB8AC3E}">
+        <p14:creationId xmlns:p14="http://schemas.microsoft.com/office/powerpoint/2010/main" val="1811660476"/>
+      </p:ext>
+    </p:extLst>
+  </p:cSld>
+  <p:clrMapOvr>
+    <a:masterClrMapping/>
+  </p:clrMapOvr>
+</p:sld>
+</file>
+
+<file path=ppt/slides/slide14.xml><?xml version="1.0" encoding="utf-8"?>
+<p:sld xmlns:a="http://schemas.openxmlformats.org/drawingml/2006/main" xmlns:r="http://schemas.openxmlformats.org/officeDocument/2006/relationships" xmlns:p="http://schemas.openxmlformats.org/presentationml/2006/main">
+  <p:cSld>
+    <p:spTree>
+      <p:nvGrpSpPr>
+        <p:cNvPr id="1" name=""/>
+        <p:cNvGrpSpPr/>
+        <p:nvPr/>
+      </p:nvGrpSpPr>
+      <p:grpSpPr>
+        <a:xfrm>
+          <a:off x="0" y="0"/>
+          <a:ext cx="0" cy="0"/>
+          <a:chOff x="0" y="0"/>
+          <a:chExt cx="0" cy="0"/>
+        </a:xfrm>
+      </p:grpSpPr>
+      <p:sp>
+        <p:nvSpPr>
+          <p:cNvPr id="2" name="Title 1">
+            <a:extLst>
+              <a:ext uri="{FF2B5EF4-FFF2-40B4-BE49-F238E27FC236}">
+                <a16:creationId xmlns:a16="http://schemas.microsoft.com/office/drawing/2014/main" id="{4305865E-ABD0-8B42-A5CB-0384843F2A53}"/>
+              </a:ext>
+            </a:extLst>
+          </p:cNvPr>
+          <p:cNvSpPr>
+            <a:spLocks noGrp="1"/>
+          </p:cNvSpPr>
+          <p:nvPr>
+            <p:ph type="title"/>
+          </p:nvPr>
+        </p:nvSpPr>
+        <p:spPr/>
+        <p:txBody>
+          <a:bodyPr/>
+          <a:lstStyle/>
+          <a:p>
+            <a:r>
+              <a:rPr lang="en-US" dirty="0"/>
+              <a:t>References</a:t>
+            </a:r>
+            <a:br>
+              <a:rPr lang="en-US" dirty="0"/>
+            </a:br>
+            <a:endParaRPr lang="en-US" dirty="0"/>
+          </a:p>
+        </p:txBody>
+      </p:sp>
+      <p:sp>
+        <p:nvSpPr>
+          <p:cNvPr id="3" name="Content Placeholder 2">
+            <a:extLst>
+              <a:ext uri="{FF2B5EF4-FFF2-40B4-BE49-F238E27FC236}">
+                <a16:creationId xmlns:a16="http://schemas.microsoft.com/office/drawing/2014/main" id="{102A33EC-C713-8546-9E13-C3398999A3CD}"/>
+              </a:ext>
+            </a:extLst>
+          </p:cNvPr>
+          <p:cNvSpPr>
+            <a:spLocks noGrp="1"/>
+          </p:cNvSpPr>
+          <p:nvPr>
+            <p:ph idx="1"/>
+          </p:nvPr>
+        </p:nvSpPr>
+        <p:spPr/>
+        <p:txBody>
+          <a:bodyPr/>
+          <a:lstStyle/>
+          <a:p>
+            <a:r>
+              <a:rPr lang="en-US" dirty="0">
+                <a:hlinkClick r:id="rId2"/>
+              </a:rPr>
+              <a:t>https://www.opentable.com/</a:t>
+            </a:r>
+          </a:p>
+          <a:p>
+            <a:r>
+              <a:rPr lang="en-US" dirty="0">
+                <a:hlinkClick r:id="rId2"/>
+              </a:rPr>
+              <a:t>http://press.opentable.com/static-files/3f990a9c-0702-4496-9b80-5b90198d056a</a:t>
+            </a:r>
+            <a:endParaRPr lang="en-US" dirty="0"/>
+          </a:p>
+          <a:p>
+            <a:endParaRPr lang="en-US" dirty="0"/>
+          </a:p>
+        </p:txBody>
+      </p:sp>
+    </p:spTree>
+    <p:extLst>
+      <p:ext uri="{BB962C8B-B14F-4D97-AF65-F5344CB8AC3E}">
+        <p14:creationId xmlns:p14="http://schemas.microsoft.com/office/powerpoint/2010/main" val="2727880619"/>
+      </p:ext>
+    </p:extLst>
+  </p:cSld>
+  <p:clrMapOvr>
+    <a:masterClrMapping/>
+  </p:clrMapOvr>
+</p:sld>
+</file>
+
+<file path=ppt/slides/slide15.xml><?xml version="1.0" encoding="utf-8"?>
+<p:sld xmlns:a="http://schemas.openxmlformats.org/drawingml/2006/main" xmlns:r="http://schemas.openxmlformats.org/officeDocument/2006/relationships" xmlns:p="http://schemas.openxmlformats.org/presentationml/2006/main">
+  <p:cSld>
+    <p:spTree>
+      <p:nvGrpSpPr>
+        <p:cNvPr id="1" name=""/>
+        <p:cNvGrpSpPr/>
+        <p:nvPr/>
+      </p:nvGrpSpPr>
+      <p:grpSpPr>
+        <a:xfrm>
+          <a:off x="0" y="0"/>
+          <a:ext cx="0" cy="0"/>
+          <a:chOff x="0" y="0"/>
+          <a:chExt cx="0" cy="0"/>
+        </a:xfrm>
+      </p:grpSpPr>
+      <p:sp>
+        <p:nvSpPr>
+          <p:cNvPr id="2" name="Title 1">
+            <a:extLst>
+              <a:ext uri="{FF2B5EF4-FFF2-40B4-BE49-F238E27FC236}">
+                <a16:creationId xmlns:a16="http://schemas.microsoft.com/office/drawing/2014/main" id="{90266776-BAB3-624D-8CF0-34AA35274829}"/>
+              </a:ext>
+            </a:extLst>
+          </p:cNvPr>
+          <p:cNvSpPr>
+            <a:spLocks noGrp="1"/>
+          </p:cNvSpPr>
+          <p:nvPr>
+            <p:ph type="title"/>
+          </p:nvPr>
+        </p:nvSpPr>
+        <p:spPr>
+          <a:xfrm>
+            <a:off x="1465866" y="1921669"/>
+            <a:ext cx="9603275" cy="3014662"/>
+          </a:xfrm>
+        </p:spPr>
+        <p:txBody>
+          <a:bodyPr anchor="ctr">
+            <a:normAutofit/>
+          </a:bodyPr>
+          <a:lstStyle/>
+          <a:p>
+            <a:pPr algn="ctr"/>
+            <a:r>
+              <a:rPr lang="en-US" sz="8800" dirty="0"/>
+              <a:t>Questions?</a:t>
+            </a:r>
+            <a:endParaRPr lang="en-US" dirty="0"/>
+          </a:p>
+        </p:txBody>
+      </p:sp>
+    </p:spTree>
+    <p:extLst>
+      <p:ext uri="{BB962C8B-B14F-4D97-AF65-F5344CB8AC3E}">
+        <p14:creationId xmlns:p14="http://schemas.microsoft.com/office/powerpoint/2010/main" val="2688027628"/>
       </p:ext>
     </p:extLst>
   </p:cSld>
@@ -7022,47 +8361,31 @@
         </p:spPr>
         <p:txBody>
           <a:bodyPr>
-            <a:normAutofit fontScale="92500" lnSpcReduction="10000"/>
+            <a:normAutofit/>
           </a:bodyPr>
           <a:lstStyle/>
           <a:p>
             <a:r>
               <a:rPr lang="en-US" dirty="0"/>
-              <a:t>What is OpenTable? (history)</a:t>
+              <a:t>What is OpenTable?</a:t>
             </a:r>
           </a:p>
           <a:p>
             <a:r>
               <a:rPr lang="en-US" dirty="0"/>
-              <a:t>What’s the question we’re answering? Where to live? Where to show family around? What’s the most popular cuisines? Which cuisines need more exposure?</a:t>
+              <a:t>Why do we care?</a:t>
             </a:r>
           </a:p>
           <a:p>
             <a:r>
               <a:rPr lang="en-US" dirty="0"/>
-              <a:t>What we scraped, dataset, limitations(booked up, not on </a:t>
-            </a:r>
-            <a:r>
-              <a:rPr lang="en-US" dirty="0" err="1"/>
-              <a:t>opentable</a:t>
-            </a:r>
+              <a:t>Scraped Data</a:t>
+            </a:r>
+          </a:p>
+          <a:p>
             <a:r>
               <a:rPr lang="en-US" dirty="0"/>
-              <a:t>, don’t take reservations that far in advanced) </a:t>
-            </a:r>
-            <a:r>
-              <a:rPr lang="en-US" dirty="0" err="1"/>
-              <a:t>Scarpetta</a:t>
-            </a:r>
-            <a:r>
-              <a:rPr lang="en-US" dirty="0"/>
-              <a:t> example</a:t>
-            </a:r>
-          </a:p>
-          <a:p>
-            <a:r>
-              <a:rPr lang="en-US" dirty="0"/>
-              <a:t>Graphs and Analysis of dataset</a:t>
+              <a:t>Analysis</a:t>
             </a:r>
           </a:p>
           <a:p>
@@ -7074,7 +8397,7 @@
           <a:p>
             <a:r>
               <a:rPr lang="en-US" dirty="0"/>
-              <a:t>Conclusions</a:t>
+              <a:t>Future Work</a:t>
             </a:r>
           </a:p>
           <a:p>
@@ -7168,48 +8491,44 @@
         </p:nvSpPr>
         <p:spPr/>
         <p:txBody>
-          <a:bodyPr/>
-          <a:lstStyle/>
-          <a:p>
-            <a:r>
-              <a:rPr lang="en-US" dirty="0"/>
+          <a:bodyPr>
+            <a:normAutofit lnSpcReduction="10000"/>
+          </a:bodyPr>
+          <a:lstStyle/>
+          <a:p>
+            <a:r>
+              <a:rPr lang="en-US" sz="2400" dirty="0"/>
               <a:t>Online restaurant reservation service</a:t>
             </a:r>
           </a:p>
           <a:p>
             <a:r>
-              <a:rPr lang="en-US" dirty="0"/>
+              <a:rPr lang="en-US" sz="2400" dirty="0"/>
               <a:t>Founded in 1998, HQ in San Francisco</a:t>
             </a:r>
           </a:p>
           <a:p>
             <a:r>
-              <a:rPr lang="en-US" dirty="0"/>
+              <a:rPr lang="en-US" sz="2400" dirty="0"/>
               <a:t>Valued at 2.6 billion in 2014</a:t>
             </a:r>
           </a:p>
           <a:p>
             <a:r>
-              <a:rPr lang="en-US" dirty="0"/>
+              <a:rPr lang="en-US" sz="2400" dirty="0"/>
               <a:t>More than 20 countries: Spain, Ireland, Germany, US, UK, Japan, India, Australia, Mexico</a:t>
             </a:r>
           </a:p>
           <a:p>
             <a:r>
-              <a:rPr lang="en-US" dirty="0"/>
+              <a:rPr lang="en-US" sz="2400" dirty="0"/>
               <a:t>1 million reviews a month, 124 million diners per month, 48,000 restaurants</a:t>
             </a:r>
           </a:p>
           <a:p>
-            <a:r>
-              <a:rPr lang="en-US" dirty="0">
-                <a:hlinkClick r:id="rId2"/>
-              </a:rPr>
-              <a:t>http://press.opentable.com/static-files/3f990a9c-0702-4496-9b80-5b90198d056a</a:t>
-            </a:r>
-            <a:endParaRPr lang="en-US" dirty="0"/>
-          </a:p>
-          <a:p>
+            <a:pPr marL="0" indent="0">
+              <a:buNone/>
+            </a:pPr>
             <a:endParaRPr lang="en-US" dirty="0"/>
           </a:p>
           <a:p>
@@ -7265,41 +8584,189 @@
         </p:nvSpPr>
         <p:spPr/>
         <p:txBody>
-          <a:bodyPr/>
-          <a:lstStyle/>
-          <a:p>
-            <a:r>
-              <a:rPr lang="en-US" dirty="0"/>
-              <a:t>Project Purpose</a:t>
-            </a:r>
-          </a:p>
-        </p:txBody>
-      </p:sp>
-      <p:sp>
-        <p:nvSpPr>
-          <p:cNvPr id="3" name="Content Placeholder 2">
+          <a:bodyPr>
+            <a:normAutofit/>
+          </a:bodyPr>
+          <a:lstStyle/>
+          <a:p>
+            <a:r>
+              <a:rPr lang="en-US" sz="4400" dirty="0"/>
+              <a:t>Why do we care?</a:t>
+            </a:r>
+          </a:p>
+        </p:txBody>
+      </p:sp>
+      <p:pic>
+        <p:nvPicPr>
+          <p:cNvPr id="5" name="Picture 4">
             <a:extLst>
               <a:ext uri="{FF2B5EF4-FFF2-40B4-BE49-F238E27FC236}">
-                <a16:creationId xmlns:a16="http://schemas.microsoft.com/office/drawing/2014/main" id="{2C4203A7-2E7E-844F-BC7B-B00EEEC934A6}"/>
+                <a16:creationId xmlns:a16="http://schemas.microsoft.com/office/drawing/2014/main" id="{577B8117-EC3B-7140-8B05-9B72ACC7A840}"/>
               </a:ext>
             </a:extLst>
           </p:cNvPr>
-          <p:cNvSpPr>
-            <a:spLocks noGrp="1"/>
-          </p:cNvSpPr>
-          <p:nvPr>
-            <p:ph idx="1"/>
-          </p:nvPr>
-        </p:nvSpPr>
-        <p:spPr/>
-        <p:txBody>
-          <a:bodyPr/>
-          <a:lstStyle/>
-          <a:p>
-            <a:endParaRPr lang="en-US"/>
-          </a:p>
-        </p:txBody>
-      </p:sp>
+          <p:cNvPicPr>
+            <a:picLocks noChangeAspect="1"/>
+          </p:cNvPicPr>
+          <p:nvPr/>
+        </p:nvPicPr>
+        <p:blipFill>
+          <a:blip r:embed="rId3"/>
+          <a:stretch>
+            <a:fillRect/>
+          </a:stretch>
+        </p:blipFill>
+        <p:spPr>
+          <a:xfrm>
+            <a:off x="1451579" y="1853754"/>
+            <a:ext cx="2153470" cy="2153470"/>
+          </a:xfrm>
+          <a:prstGeom prst="rect">
+            <a:avLst/>
+          </a:prstGeom>
+        </p:spPr>
+      </p:pic>
+      <p:sp>
+        <p:nvSpPr>
+          <p:cNvPr id="8" name="TextBox 7">
+            <a:extLst>
+              <a:ext uri="{FF2B5EF4-FFF2-40B4-BE49-F238E27FC236}">
+                <a16:creationId xmlns:a16="http://schemas.microsoft.com/office/drawing/2014/main" id="{9FB5DDF5-9CC1-694C-BF9D-93A621C346B0}"/>
+              </a:ext>
+            </a:extLst>
+          </p:cNvPr>
+          <p:cNvSpPr txBox="1"/>
+          <p:nvPr/>
+        </p:nvSpPr>
+        <p:spPr>
+          <a:xfrm>
+            <a:off x="4061012" y="2389039"/>
+            <a:ext cx="2304542" cy="830997"/>
+          </a:xfrm>
+          <a:prstGeom prst="rect">
+            <a:avLst/>
+          </a:prstGeom>
+          <a:noFill/>
+        </p:spPr>
+        <p:txBody>
+          <a:bodyPr wrap="none" rtlCol="0">
+            <a:spAutoFit/>
+          </a:bodyPr>
+          <a:lstStyle/>
+          <a:p>
+            <a:r>
+              <a:rPr lang="en-US" sz="4800" dirty="0"/>
+              <a:t>Personal</a:t>
+            </a:r>
+            <a:endParaRPr lang="en-US" dirty="0"/>
+          </a:p>
+        </p:txBody>
+      </p:sp>
+      <p:sp>
+        <p:nvSpPr>
+          <p:cNvPr id="9" name="TextBox 8">
+            <a:extLst>
+              <a:ext uri="{FF2B5EF4-FFF2-40B4-BE49-F238E27FC236}">
+                <a16:creationId xmlns:a16="http://schemas.microsoft.com/office/drawing/2014/main" id="{355C8FE9-C2BA-CF4F-8C73-B60800763D54}"/>
+              </a:ext>
+            </a:extLst>
+          </p:cNvPr>
+          <p:cNvSpPr txBox="1"/>
+          <p:nvPr/>
+        </p:nvSpPr>
+        <p:spPr>
+          <a:xfrm>
+            <a:off x="5685592" y="3453299"/>
+            <a:ext cx="889987" cy="830997"/>
+          </a:xfrm>
+          <a:prstGeom prst="rect">
+            <a:avLst/>
+          </a:prstGeom>
+          <a:noFill/>
+        </p:spPr>
+        <p:txBody>
+          <a:bodyPr wrap="none" rtlCol="0">
+            <a:spAutoFit/>
+          </a:bodyPr>
+          <a:lstStyle/>
+          <a:p>
+            <a:r>
+              <a:rPr lang="en-US" sz="4800" dirty="0"/>
+              <a:t>VS</a:t>
+            </a:r>
+            <a:r>
+              <a:rPr lang="en-US" dirty="0"/>
+              <a:t>.</a:t>
+            </a:r>
+          </a:p>
+        </p:txBody>
+      </p:sp>
+      <p:sp>
+        <p:nvSpPr>
+          <p:cNvPr id="10" name="TextBox 9">
+            <a:extLst>
+              <a:ext uri="{FF2B5EF4-FFF2-40B4-BE49-F238E27FC236}">
+                <a16:creationId xmlns:a16="http://schemas.microsoft.com/office/drawing/2014/main" id="{579365C9-C43C-7D45-BEED-1B63F2A7ACF8}"/>
+              </a:ext>
+            </a:extLst>
+          </p:cNvPr>
+          <p:cNvSpPr txBox="1"/>
+          <p:nvPr/>
+        </p:nvSpPr>
+        <p:spPr>
+          <a:xfrm>
+            <a:off x="5892122" y="4588748"/>
+            <a:ext cx="2287806" cy="830997"/>
+          </a:xfrm>
+          <a:prstGeom prst="rect">
+            <a:avLst/>
+          </a:prstGeom>
+          <a:noFill/>
+        </p:spPr>
+        <p:txBody>
+          <a:bodyPr wrap="none" rtlCol="0">
+            <a:spAutoFit/>
+          </a:bodyPr>
+          <a:lstStyle/>
+          <a:p>
+            <a:r>
+              <a:rPr lang="en-US" sz="4800" dirty="0"/>
+              <a:t>Business</a:t>
+            </a:r>
+            <a:endParaRPr lang="en-US" dirty="0"/>
+          </a:p>
+        </p:txBody>
+      </p:sp>
+      <p:pic>
+        <p:nvPicPr>
+          <p:cNvPr id="12" name="Picture 11">
+            <a:extLst>
+              <a:ext uri="{FF2B5EF4-FFF2-40B4-BE49-F238E27FC236}">
+                <a16:creationId xmlns:a16="http://schemas.microsoft.com/office/drawing/2014/main" id="{03AAC3A3-FA75-6145-B8D0-127F2D575AFB}"/>
+              </a:ext>
+            </a:extLst>
+          </p:cNvPr>
+          <p:cNvPicPr>
+            <a:picLocks noChangeAspect="1"/>
+          </p:cNvPicPr>
+          <p:nvPr/>
+        </p:nvPicPr>
+        <p:blipFill>
+          <a:blip r:embed="rId4"/>
+          <a:stretch>
+            <a:fillRect/>
+          </a:stretch>
+        </p:blipFill>
+        <p:spPr>
+          <a:xfrm>
+            <a:off x="8487563" y="4007224"/>
+            <a:ext cx="2881772" cy="1922928"/>
+          </a:xfrm>
+          <a:prstGeom prst="rect">
+            <a:avLst/>
+          </a:prstGeom>
+        </p:spPr>
+      </p:pic>
     </p:spTree>
     <p:extLst>
       <p:ext uri="{BB962C8B-B14F-4D97-AF65-F5344CB8AC3E}">
@@ -7348,20 +8815,14 @@
         </p:nvSpPr>
         <p:spPr/>
         <p:txBody>
-          <a:bodyPr/>
-          <a:lstStyle/>
-          <a:p>
-            <a:r>
-              <a:rPr lang="en-US" dirty="0"/>
-              <a:t>Scraped Data (</a:t>
-            </a:r>
-            <a:r>
-              <a:rPr lang="en-US" dirty="0" err="1"/>
-              <a:t>Scarpetta</a:t>
-            </a:r>
-            <a:r>
-              <a:rPr lang="en-US" dirty="0"/>
-              <a:t>)</a:t>
+          <a:bodyPr>
+            <a:normAutofit/>
+          </a:bodyPr>
+          <a:lstStyle/>
+          <a:p>
+            <a:r>
+              <a:rPr lang="en-US" sz="4400" dirty="0"/>
+              <a:t>Scraped Data</a:t>
             </a:r>
           </a:p>
         </p:txBody>
@@ -7388,11 +8849,50 @@
           <a:lstStyle/>
           <a:p>
             <a:r>
+              <a:rPr lang="en-US" dirty="0"/>
+              <a:t>Restaurant</a:t>
+            </a:r>
+          </a:p>
+          <a:p>
+            <a:r>
+              <a:rPr lang="en-US" dirty="0"/>
+              <a:t>Location</a:t>
+            </a:r>
+          </a:p>
+          <a:p>
+            <a:r>
+              <a:rPr lang="en-US" dirty="0"/>
+              <a:t>Cuisine</a:t>
+            </a:r>
+          </a:p>
+          <a:p>
+            <a:r>
+              <a:rPr lang="en-US" dirty="0"/>
+              <a:t>Price</a:t>
+            </a:r>
+          </a:p>
+          <a:p>
+            <a:r>
+              <a:rPr lang="en-US" dirty="0"/>
+              <a:t>Ratings (Food, Service,  Ambience,  Value)</a:t>
+            </a:r>
+          </a:p>
+          <a:p>
+            <a:r>
+              <a:rPr lang="en-US" dirty="0"/>
+              <a:t>Number of Reviews and Recommendation Percentage</a:t>
+            </a:r>
+          </a:p>
+          <a:p>
+            <a:r>
               <a:rPr lang="en-US" dirty="0">
                 <a:hlinkClick r:id="rId2"/>
               </a:rPr>
               <a:t>Scarpetta</a:t>
             </a:r>
+            <a:endParaRPr lang="en-US" dirty="0"/>
+          </a:p>
+          <a:p>
             <a:endParaRPr lang="en-US" dirty="0"/>
           </a:p>
         </p:txBody>
@@ -7429,10 +8929,10 @@
       </p:grpSpPr>
       <p:sp>
         <p:nvSpPr>
-          <p:cNvPr id="2" name="Title 1">
+          <p:cNvPr id="3" name="Content Placeholder 2">
             <a:extLst>
               <a:ext uri="{FF2B5EF4-FFF2-40B4-BE49-F238E27FC236}">
-                <a16:creationId xmlns:a16="http://schemas.microsoft.com/office/drawing/2014/main" id="{9B02F6A0-D9CD-2E46-868C-EB236CBBD5E0}"/>
+                <a16:creationId xmlns:a16="http://schemas.microsoft.com/office/drawing/2014/main" id="{0794A066-9B5A-D34B-9B13-15A67CDF43A1}"/>
               </a:ext>
             </a:extLst>
           </p:cNvPr>
@@ -7440,50 +8940,36 @@
             <a:spLocks noGrp="1"/>
           </p:cNvSpPr>
           <p:nvPr>
-            <p:ph type="title"/>
-          </p:nvPr>
-        </p:nvSpPr>
-        <p:spPr/>
-        <p:txBody>
-          <a:bodyPr/>
-          <a:lstStyle/>
-          <a:p>
-            <a:r>
-              <a:rPr lang="en-US" dirty="0"/>
-              <a:t>Graphs and Analysis</a:t>
-            </a:r>
-          </a:p>
-        </p:txBody>
-      </p:sp>
-      <p:sp>
-        <p:nvSpPr>
-          <p:cNvPr id="3" name="Content Placeholder 2">
-            <a:extLst>
-              <a:ext uri="{FF2B5EF4-FFF2-40B4-BE49-F238E27FC236}">
-                <a16:creationId xmlns:a16="http://schemas.microsoft.com/office/drawing/2014/main" id="{FC3746B6-DF7C-324F-B7D9-702B5ECE7193}"/>
-              </a:ext>
-            </a:extLst>
-          </p:cNvPr>
-          <p:cNvSpPr>
-            <a:spLocks noGrp="1"/>
-          </p:cNvSpPr>
-          <p:nvPr>
             <p:ph idx="1"/>
           </p:nvPr>
         </p:nvSpPr>
-        <p:spPr/>
-        <p:txBody>
-          <a:bodyPr/>
-          <a:lstStyle/>
-          <a:p>
-            <a:endParaRPr lang="en-US"/>
+        <p:spPr>
+          <a:xfrm>
+            <a:off x="3883607" y="2406360"/>
+            <a:ext cx="4424786" cy="2045280"/>
+          </a:xfrm>
+        </p:spPr>
+        <p:txBody>
+          <a:bodyPr>
+            <a:normAutofit/>
+          </a:bodyPr>
+          <a:lstStyle/>
+          <a:p>
+            <a:pPr marL="0" indent="0">
+              <a:buNone/>
+            </a:pPr>
+            <a:r>
+              <a:rPr lang="en-US" sz="8800" dirty="0"/>
+              <a:t>Analysis</a:t>
+            </a:r>
+            <a:endParaRPr lang="en-US" sz="1600" dirty="0"/>
           </a:p>
         </p:txBody>
       </p:sp>
     </p:spTree>
     <p:extLst>
       <p:ext uri="{BB962C8B-B14F-4D97-AF65-F5344CB8AC3E}">
-        <p14:creationId xmlns:p14="http://schemas.microsoft.com/office/powerpoint/2010/main" val="3866104331"/>
+        <p14:creationId xmlns:p14="http://schemas.microsoft.com/office/powerpoint/2010/main" val="1560456840"/>
       </p:ext>
     </p:extLst>
   </p:cSld>
@@ -7510,63 +8996,77 @@
           <a:chExt cx="0" cy="0"/>
         </a:xfrm>
       </p:grpSpPr>
-      <p:sp>
-        <p:nvSpPr>
-          <p:cNvPr id="2" name="Title 1">
+      <p:pic>
+        <p:nvPicPr>
+          <p:cNvPr id="5" name="Picture 4">
             <a:extLst>
               <a:ext uri="{FF2B5EF4-FFF2-40B4-BE49-F238E27FC236}">
-                <a16:creationId xmlns:a16="http://schemas.microsoft.com/office/drawing/2014/main" id="{847061A4-27A9-214E-92DE-D156CACCF64A}"/>
+                <a16:creationId xmlns:a16="http://schemas.microsoft.com/office/drawing/2014/main" id="{8A4C349D-413D-C244-B14A-B16D71884406}"/>
               </a:ext>
             </a:extLst>
           </p:cNvPr>
-          <p:cNvSpPr>
-            <a:spLocks noGrp="1"/>
-          </p:cNvSpPr>
-          <p:nvPr>
-            <p:ph type="title"/>
-          </p:nvPr>
-        </p:nvSpPr>
-        <p:spPr/>
-        <p:txBody>
-          <a:bodyPr/>
-          <a:lstStyle/>
-          <a:p>
-            <a:r>
-              <a:rPr lang="en-US" dirty="0"/>
-              <a:t>findings</a:t>
-            </a:r>
-          </a:p>
-        </p:txBody>
-      </p:sp>
-      <p:sp>
-        <p:nvSpPr>
-          <p:cNvPr id="3" name="Content Placeholder 2">
+          <p:cNvPicPr>
+            <a:picLocks noChangeAspect="1"/>
+          </p:cNvPicPr>
+          <p:nvPr/>
+        </p:nvPicPr>
+        <p:blipFill>
+          <a:blip r:embed="rId2"/>
+          <a:stretch>
+            <a:fillRect/>
+          </a:stretch>
+        </p:blipFill>
+        <p:spPr>
+          <a:xfrm>
+            <a:off x="1284194" y="173912"/>
+            <a:ext cx="9623611" cy="5774166"/>
+          </a:xfrm>
+          <a:prstGeom prst="rect">
+            <a:avLst/>
+          </a:prstGeom>
+        </p:spPr>
+      </p:pic>
+      <p:sp>
+        <p:nvSpPr>
+          <p:cNvPr id="3" name="Rectangle 2">
             <a:extLst>
               <a:ext uri="{FF2B5EF4-FFF2-40B4-BE49-F238E27FC236}">
-                <a16:creationId xmlns:a16="http://schemas.microsoft.com/office/drawing/2014/main" id="{3DCEEBC6-6FC8-454A-9A9F-7B6D201950C8}"/>
+                <a16:creationId xmlns:a16="http://schemas.microsoft.com/office/drawing/2014/main" id="{B874810D-32A7-6B4E-9F59-19CD8D90DA68}"/>
               </a:ext>
             </a:extLst>
           </p:cNvPr>
-          <p:cNvSpPr>
-            <a:spLocks noGrp="1"/>
-          </p:cNvSpPr>
-          <p:nvPr>
-            <p:ph idx="1"/>
-          </p:nvPr>
-        </p:nvSpPr>
-        <p:spPr/>
-        <p:txBody>
-          <a:bodyPr/>
-          <a:lstStyle/>
-          <a:p>
-            <a:endParaRPr lang="en-US"/>
+          <p:cNvSpPr/>
+          <p:nvPr/>
+        </p:nvSpPr>
+        <p:spPr>
+          <a:xfrm>
+            <a:off x="9521918" y="540590"/>
+            <a:ext cx="1170705" cy="369332"/>
+          </a:xfrm>
+          <a:prstGeom prst="rect">
+            <a:avLst/>
+          </a:prstGeom>
+        </p:spPr>
+        <p:txBody>
+          <a:bodyPr wrap="none">
+            <a:spAutoFit/>
+          </a:bodyPr>
+          <a:lstStyle/>
+          <a:p>
+            <a:r>
+              <a:rPr lang="en-US" dirty="0">
+                <a:hlinkClick r:id="rId3"/>
+              </a:rPr>
+              <a:t>Interactive</a:t>
+            </a:r>
+            <a:endParaRPr lang="en-US" dirty="0"/>
           </a:p>
         </p:txBody>
       </p:sp>
     </p:spTree>
     <p:extLst>
       <p:ext uri="{BB962C8B-B14F-4D97-AF65-F5344CB8AC3E}">
-        <p14:creationId xmlns:p14="http://schemas.microsoft.com/office/powerpoint/2010/main" val="1124996322"/>
+        <p14:creationId xmlns:p14="http://schemas.microsoft.com/office/powerpoint/2010/main" val="2660819049"/>
       </p:ext>
     </p:extLst>
   </p:cSld>
@@ -7598,7 +9098,7 @@
           <p:cNvPr id="2" name="Title 1">
             <a:extLst>
               <a:ext uri="{FF2B5EF4-FFF2-40B4-BE49-F238E27FC236}">
-                <a16:creationId xmlns:a16="http://schemas.microsoft.com/office/drawing/2014/main" id="{4A89F021-91FD-0542-A098-2B10CDB39E34}"/>
+                <a16:creationId xmlns:a16="http://schemas.microsoft.com/office/drawing/2014/main" id="{847061A4-27A9-214E-92DE-D156CACCF64A}"/>
               </a:ext>
             </a:extLst>
           </p:cNvPr>
@@ -7615,9 +9115,10 @@
           <a:lstStyle/>
           <a:p>
             <a:r>
-              <a:rPr lang="en-US" dirty="0"/>
-              <a:t>conclusion</a:t>
-            </a:r>
+              <a:rPr lang="en-US" sz="4400" dirty="0"/>
+              <a:t>Limitations</a:t>
+            </a:r>
+            <a:endParaRPr lang="en-US" dirty="0"/>
           </a:p>
         </p:txBody>
       </p:sp>
@@ -7626,7 +9127,7 @@
           <p:cNvPr id="3" name="Content Placeholder 2">
             <a:extLst>
               <a:ext uri="{FF2B5EF4-FFF2-40B4-BE49-F238E27FC236}">
-                <a16:creationId xmlns:a16="http://schemas.microsoft.com/office/drawing/2014/main" id="{29BC6EB3-4770-494A-B0F5-EEF7D75DEDD9}"/>
+                <a16:creationId xmlns:a16="http://schemas.microsoft.com/office/drawing/2014/main" id="{3DCEEBC6-6FC8-454A-9A9F-7B6D201950C8}"/>
               </a:ext>
             </a:extLst>
           </p:cNvPr>
@@ -7642,14 +9143,53 @@
           <a:bodyPr/>
           <a:lstStyle/>
           <a:p>
-            <a:endParaRPr lang="en-US"/>
+            <a:r>
+              <a:rPr lang="en-US" dirty="0"/>
+              <a:t>Not all restaurants are on OpenTable</a:t>
+            </a:r>
+          </a:p>
+          <a:p>
+            <a:r>
+              <a:rPr lang="en-US" dirty="0"/>
+              <a:t>Searched only Manhattan</a:t>
+            </a:r>
+          </a:p>
+          <a:p>
+            <a:r>
+              <a:rPr lang="en-US" dirty="0"/>
+              <a:t>Date of reservation</a:t>
+            </a:r>
+          </a:p>
+          <a:p>
+            <a:r>
+              <a:rPr lang="en-US" dirty="0"/>
+              <a:t>Some locations have very few restaurants (count &lt; 5)</a:t>
+            </a:r>
+          </a:p>
+          <a:p>
+            <a:r>
+              <a:rPr lang="en-US" dirty="0"/>
+              <a:t>Bar/Pub type restaurants are included (Noise)</a:t>
+            </a:r>
+          </a:p>
+          <a:p>
+            <a:r>
+              <a:rPr lang="en-US" dirty="0"/>
+              <a:t>Lower price has a higher variance in rating (Price)</a:t>
+            </a:r>
+          </a:p>
+          <a:p>
+            <a:r>
+              <a:rPr lang="en-US" dirty="0"/>
+              <a:t>Not all restaurants have a known chef (Credibility)</a:t>
+            </a:r>
           </a:p>
         </p:txBody>
       </p:sp>
     </p:spTree>
     <p:extLst>
       <p:ext uri="{BB962C8B-B14F-4D97-AF65-F5344CB8AC3E}">
-        <p14:creationId xmlns:p14="http://schemas.microsoft.com/office/powerpoint/2010/main" val="1811660476"/>
+        <p14:creationId xmlns:p14="http://schemas.microsoft.com/office/powerpoint/2010/main" val="1124996322"/>
       </p:ext>
     </p:extLst>
   </p:cSld>
@@ -7676,38 +9216,68 @@
           <a:chExt cx="0" cy="0"/>
         </a:xfrm>
       </p:grpSpPr>
-      <p:sp>
-        <p:nvSpPr>
-          <p:cNvPr id="2" name="Title 1">
+      <p:pic>
+        <p:nvPicPr>
+          <p:cNvPr id="4" name="Picture 3">
             <a:extLst>
               <a:ext uri="{FF2B5EF4-FFF2-40B4-BE49-F238E27FC236}">
-                <a16:creationId xmlns:a16="http://schemas.microsoft.com/office/drawing/2014/main" id="{90266776-BAB3-624D-8CF0-34AA35274829}"/>
+                <a16:creationId xmlns:a16="http://schemas.microsoft.com/office/drawing/2014/main" id="{946AE533-4582-3740-9B37-B97E9294776B}"/>
               </a:ext>
             </a:extLst>
           </p:cNvPr>
-          <p:cNvSpPr>
-            <a:spLocks noGrp="1"/>
-          </p:cNvSpPr>
-          <p:nvPr>
-            <p:ph type="title"/>
-          </p:nvPr>
-        </p:nvSpPr>
+          <p:cNvPicPr>
+            <a:picLocks noChangeAspect="1"/>
+          </p:cNvPicPr>
+          <p:nvPr/>
+        </p:nvPicPr>
+        <p:blipFill>
+          <a:blip r:embed="rId2"/>
+          <a:stretch>
+            <a:fillRect/>
+          </a:stretch>
+        </p:blipFill>
         <p:spPr>
           <a:xfrm>
-            <a:off x="1465866" y="1921669"/>
-            <a:ext cx="9603275" cy="3014662"/>
+            <a:off x="2082800" y="146423"/>
+            <a:ext cx="8026400" cy="5733143"/>
           </a:xfrm>
+          <a:prstGeom prst="rect">
+            <a:avLst/>
+          </a:prstGeom>
         </p:spPr>
-        <p:txBody>
-          <a:bodyPr anchor="ctr">
-            <a:normAutofit/>
+      </p:pic>
+      <p:sp>
+        <p:nvSpPr>
+          <p:cNvPr id="3" name="Rectangle 2">
+            <a:extLst>
+              <a:ext uri="{FF2B5EF4-FFF2-40B4-BE49-F238E27FC236}">
+                <a16:creationId xmlns:a16="http://schemas.microsoft.com/office/drawing/2014/main" id="{B874810D-32A7-6B4E-9F59-19CD8D90DA68}"/>
+              </a:ext>
+            </a:extLst>
+          </p:cNvPr>
+          <p:cNvSpPr/>
+          <p:nvPr/>
+        </p:nvSpPr>
+        <p:spPr>
+          <a:xfrm>
+            <a:off x="8715094" y="419567"/>
+            <a:ext cx="1170705" cy="369332"/>
+          </a:xfrm>
+          <a:prstGeom prst="rect">
+            <a:avLst/>
+          </a:prstGeom>
+        </p:spPr>
+        <p:txBody>
+          <a:bodyPr wrap="none">
+            <a:spAutoFit/>
           </a:bodyPr>
           <a:lstStyle/>
           <a:p>
-            <a:pPr algn="ctr"/>
-            <a:r>
-              <a:rPr lang="en-US" sz="8800" dirty="0"/>
-              <a:t>Questions?</a:t>
+            <a:r>
+              <a:rPr lang="en-US" dirty="0">
+                <a:hlinkClick r:id="rId3"/>
+              </a:rPr>
+              <a:t>Interactive</a:t>
             </a:r>
             <a:endParaRPr lang="en-US" dirty="0"/>
           </a:p>
@@ -7716,7 +9286,7 @@
     </p:spTree>
     <p:extLst>
       <p:ext uri="{BB962C8B-B14F-4D97-AF65-F5344CB8AC3E}">
-        <p14:creationId xmlns:p14="http://schemas.microsoft.com/office/powerpoint/2010/main" val="2688027628"/>
+        <p14:creationId xmlns:p14="http://schemas.microsoft.com/office/powerpoint/2010/main" val="3617742475"/>
       </p:ext>
     </p:extLst>
   </p:cSld>
@@ -8272,4 +9842,594 @@
     </a:ext>
   </a:extLst>
 </a:theme>
+</file>
+
+<file path=ppt/theme/theme3.xml><?xml version="1.0" encoding="utf-8"?>
+<a:theme xmlns:a="http://schemas.openxmlformats.org/drawingml/2006/main" name="Office Theme">
+  <a:themeElements>
+    <a:clrScheme name="Office">
+      <a:dk1>
+        <a:sysClr val="windowText" lastClr="000000"/>
+      </a:dk1>
+      <a:lt1>
+        <a:sysClr val="window" lastClr="FFFFFF"/>
+      </a:lt1>
+      <a:dk2>
+        <a:srgbClr val="44546A"/>
+      </a:dk2>
+      <a:lt2>
+        <a:srgbClr val="E7E6E6"/>
+      </a:lt2>
+      <a:accent1>
+        <a:srgbClr val="4472C4"/>
+      </a:accent1>
+      <a:accent2>
+        <a:srgbClr val="ED7D31"/>
+      </a:accent2>
+      <a:accent3>
+        <a:srgbClr val="A5A5A5"/>
+      </a:accent3>
+      <a:accent4>
+        <a:srgbClr val="FFC000"/>
+      </a:accent4>
+      <a:accent5>
+        <a:srgbClr val="5B9BD5"/>
+      </a:accent5>
+      <a:accent6>
+        <a:srgbClr val="70AD47"/>
+      </a:accent6>
+      <a:hlink>
+        <a:srgbClr val="0563C1"/>
+      </a:hlink>
+      <a:folHlink>
+        <a:srgbClr val="954F72"/>
+      </a:folHlink>
+    </a:clrScheme>
+    <a:fontScheme name="Office">
+      <a:majorFont>
+        <a:latin typeface="Calibri Light" panose="020F0302020204030204"/>
+        <a:ea typeface=""/>
+        <a:cs typeface=""/>
+        <a:font script="Jpan" typeface="游ゴシック Light"/>
+        <a:font script="Hang" typeface="맑은 고딕"/>
+        <a:font script="Hans" typeface="等线 Light"/>
+        <a:font script="Hant" typeface="新細明體"/>
+        <a:font script="Arab" typeface="Times New Roman"/>
+        <a:font script="Hebr" typeface="Times New Roman"/>
+        <a:font script="Thai" typeface="Angsana New"/>
+        <a:font script="Ethi" typeface="Nyala"/>
+        <a:font script="Beng" typeface="Vrinda"/>
+        <a:font script="Gujr" typeface="Shruti"/>
+        <a:font script="Khmr" typeface="MoolBoran"/>
+        <a:font script="Knda" typeface="Tunga"/>
+        <a:font script="Guru" typeface="Raavi"/>
+        <a:font script="Cans" typeface="Euphemia"/>
+        <a:font script="Cher" typeface="Plantagenet Cherokee"/>
+        <a:font script="Yiii" typeface="Microsoft Yi Baiti"/>
+        <a:font script="Tibt" typeface="Microsoft Himalaya"/>
+        <a:font script="Thaa" typeface="MV Boli"/>
+        <a:font script="Deva" typeface="Mangal"/>
+        <a:font script="Telu" typeface="Gautami"/>
+        <a:font script="Taml" typeface="Latha"/>
+        <a:font script="Syrc" typeface="Estrangelo Edessa"/>
+        <a:font script="Orya" typeface="Kalinga"/>
+        <a:font script="Mlym" typeface="Kartika"/>
+        <a:font script="Laoo" typeface="DokChampa"/>
+        <a:font script="Sinh" typeface="Iskoola Pota"/>
+        <a:font script="Mong" typeface="Mongolian Baiti"/>
+        <a:font script="Viet" typeface="Times New Roman"/>
+        <a:font script="Uigh" typeface="Microsoft Uighur"/>
+        <a:font script="Geor" typeface="Sylfaen"/>
+        <a:font script="Armn" typeface="Arial"/>
+        <a:font script="Bugi" typeface="Leelawadee UI"/>
+        <a:font script="Bopo" typeface="Microsoft JhengHei"/>
+        <a:font script="Java" typeface="Javanese Text"/>
+        <a:font script="Lisu" typeface="Segoe UI"/>
+        <a:font script="Mymr" typeface="Myanmar Text"/>
+        <a:font script="Nkoo" typeface="Ebrima"/>
+        <a:font script="Olck" typeface="Nirmala UI"/>
+        <a:font script="Osma" typeface="Ebrima"/>
+        <a:font script="Phag" typeface="Phagspa"/>
+        <a:font script="Syrn" typeface="Estrangelo Edessa"/>
+        <a:font script="Syrj" typeface="Estrangelo Edessa"/>
+        <a:font script="Syre" typeface="Estrangelo Edessa"/>
+        <a:font script="Sora" typeface="Nirmala UI"/>
+        <a:font script="Tale" typeface="Microsoft Tai Le"/>
+        <a:font script="Talu" typeface="Microsoft New Tai Lue"/>
+        <a:font script="Tfng" typeface="Ebrima"/>
+      </a:majorFont>
+      <a:minorFont>
+        <a:latin typeface="Calibri" panose="020F0502020204030204"/>
+        <a:ea typeface=""/>
+        <a:cs typeface=""/>
+        <a:font script="Jpan" typeface="游ゴシック"/>
+        <a:font script="Hang" typeface="맑은 고딕"/>
+        <a:font script="Hans" typeface="等线"/>
+        <a:font script="Hant" typeface="新細明體"/>
+        <a:font script="Arab" typeface="Arial"/>
+        <a:font script="Hebr" typeface="Arial"/>
+        <a:font script="Thai" typeface="Cordia New"/>
+        <a:font script="Ethi" typeface="Nyala"/>
+        <a:font script="Beng" typeface="Vrinda"/>
+        <a:font script="Gujr" typeface="Shruti"/>
+        <a:font script="Khmr" typeface="DaunPenh"/>
+        <a:font script="Knda" typeface="Tunga"/>
+        <a:font script="Guru" typeface="Raavi"/>
+        <a:font script="Cans" typeface="Euphemia"/>
+        <a:font script="Cher" typeface="Plantagenet Cherokee"/>
+        <a:font script="Yiii" typeface="Microsoft Yi Baiti"/>
+        <a:font script="Tibt" typeface="Microsoft Himalaya"/>
+        <a:font script="Thaa" typeface="MV Boli"/>
+        <a:font script="Deva" typeface="Mangal"/>
+        <a:font script="Telu" typeface="Gautami"/>
+        <a:font script="Taml" typeface="Latha"/>
+        <a:font script="Syrc" typeface="Estrangelo Edessa"/>
+        <a:font script="Orya" typeface="Kalinga"/>
+        <a:font script="Mlym" typeface="Kartika"/>
+        <a:font script="Laoo" typeface="DokChampa"/>
+        <a:font script="Sinh" typeface="Iskoola Pota"/>
+        <a:font script="Mong" typeface="Mongolian Baiti"/>
+        <a:font script="Viet" typeface="Arial"/>
+        <a:font script="Uigh" typeface="Microsoft Uighur"/>
+        <a:font script="Geor" typeface="Sylfaen"/>
+        <a:font script="Armn" typeface="Arial"/>
+        <a:font script="Bugi" typeface="Leelawadee UI"/>
+        <a:font script="Bopo" typeface="Microsoft JhengHei"/>
+        <a:font script="Java" typeface="Javanese Text"/>
+        <a:font script="Lisu" typeface="Segoe UI"/>
+        <a:font script="Mymr" typeface="Myanmar Text"/>
+        <a:font script="Nkoo" typeface="Ebrima"/>
+        <a:font script="Olck" typeface="Nirmala UI"/>
+        <a:font script="Osma" typeface="Ebrima"/>
+        <a:font script="Phag" typeface="Phagspa"/>
+        <a:font script="Syrn" typeface="Estrangelo Edessa"/>
+        <a:font script="Syrj" typeface="Estrangelo Edessa"/>
+        <a:font script="Syre" typeface="Estrangelo Edessa"/>
+        <a:font script="Sora" typeface="Nirmala UI"/>
+        <a:font script="Tale" typeface="Microsoft Tai Le"/>
+        <a:font script="Talu" typeface="Microsoft New Tai Lue"/>
+        <a:font script="Tfng" typeface="Ebrima"/>
+      </a:minorFont>
+    </a:fontScheme>
+    <a:fmtScheme name="Office">
+      <a:fillStyleLst>
+        <a:solidFill>
+          <a:schemeClr val="phClr"/>
+        </a:solidFill>
+        <a:gradFill rotWithShape="1">
+          <a:gsLst>
+            <a:gs pos="0">
+              <a:schemeClr val="phClr">
+                <a:lumMod val="110000"/>
+                <a:satMod val="105000"/>
+                <a:tint val="67000"/>
+              </a:schemeClr>
+            </a:gs>
+            <a:gs pos="50000">
+              <a:schemeClr val="phClr">
+                <a:lumMod val="105000"/>
+                <a:satMod val="103000"/>
+                <a:tint val="73000"/>
+              </a:schemeClr>
+            </a:gs>
+            <a:gs pos="100000">
+              <a:schemeClr val="phClr">
+                <a:lumMod val="105000"/>
+                <a:satMod val="109000"/>
+                <a:tint val="81000"/>
+              </a:schemeClr>
+            </a:gs>
+          </a:gsLst>
+          <a:lin ang="5400000" scaled="0"/>
+        </a:gradFill>
+        <a:gradFill rotWithShape="1">
+          <a:gsLst>
+            <a:gs pos="0">
+              <a:schemeClr val="phClr">
+                <a:satMod val="103000"/>
+                <a:lumMod val="102000"/>
+                <a:tint val="94000"/>
+              </a:schemeClr>
+            </a:gs>
+            <a:gs pos="50000">
+              <a:schemeClr val="phClr">
+                <a:satMod val="110000"/>
+                <a:lumMod val="100000"/>
+                <a:shade val="100000"/>
+              </a:schemeClr>
+            </a:gs>
+            <a:gs pos="100000">
+              <a:schemeClr val="phClr">
+                <a:lumMod val="99000"/>
+                <a:satMod val="120000"/>
+                <a:shade val="78000"/>
+              </a:schemeClr>
+            </a:gs>
+          </a:gsLst>
+          <a:lin ang="5400000" scaled="0"/>
+        </a:gradFill>
+      </a:fillStyleLst>
+      <a:lnStyleLst>
+        <a:ln w="6350" cap="flat" cmpd="sng" algn="ctr">
+          <a:solidFill>
+            <a:schemeClr val="phClr"/>
+          </a:solidFill>
+          <a:prstDash val="solid"/>
+          <a:miter lim="800000"/>
+        </a:ln>
+        <a:ln w="12700" cap="flat" cmpd="sng" algn="ctr">
+          <a:solidFill>
+            <a:schemeClr val="phClr"/>
+          </a:solidFill>
+          <a:prstDash val="solid"/>
+          <a:miter lim="800000"/>
+        </a:ln>
+        <a:ln w="19050" cap="flat" cmpd="sng" algn="ctr">
+          <a:solidFill>
+            <a:schemeClr val="phClr"/>
+          </a:solidFill>
+          <a:prstDash val="solid"/>
+          <a:miter lim="800000"/>
+        </a:ln>
+      </a:lnStyleLst>
+      <a:effectStyleLst>
+        <a:effectStyle>
+          <a:effectLst/>
+        </a:effectStyle>
+        <a:effectStyle>
+          <a:effectLst/>
+        </a:effectStyle>
+        <a:effectStyle>
+          <a:effectLst>
+            <a:outerShdw blurRad="57150" dist="19050" dir="5400000" algn="ctr" rotWithShape="0">
+              <a:srgbClr val="000000">
+                <a:alpha val="63000"/>
+              </a:srgbClr>
+            </a:outerShdw>
+          </a:effectLst>
+        </a:effectStyle>
+      </a:effectStyleLst>
+      <a:bgFillStyleLst>
+        <a:solidFill>
+          <a:schemeClr val="phClr"/>
+        </a:solidFill>
+        <a:solidFill>
+          <a:schemeClr val="phClr">
+            <a:tint val="95000"/>
+            <a:satMod val="170000"/>
+          </a:schemeClr>
+        </a:solidFill>
+        <a:gradFill rotWithShape="1">
+          <a:gsLst>
+            <a:gs pos="0">
+              <a:schemeClr val="phClr">
+                <a:tint val="93000"/>
+                <a:satMod val="150000"/>
+                <a:shade val="98000"/>
+                <a:lumMod val="102000"/>
+              </a:schemeClr>
+            </a:gs>
+            <a:gs pos="50000">
+              <a:schemeClr val="phClr">
+                <a:tint val="98000"/>
+                <a:satMod val="130000"/>
+                <a:shade val="90000"/>
+                <a:lumMod val="103000"/>
+              </a:schemeClr>
+            </a:gs>
+            <a:gs pos="100000">
+              <a:schemeClr val="phClr">
+                <a:shade val="63000"/>
+                <a:satMod val="120000"/>
+              </a:schemeClr>
+            </a:gs>
+          </a:gsLst>
+          <a:lin ang="5400000" scaled="0"/>
+        </a:gradFill>
+      </a:bgFillStyleLst>
+    </a:fmtScheme>
+  </a:themeElements>
+  <a:objectDefaults/>
+  <a:extraClrSchemeLst/>
+  <a:extLst>
+    <a:ext uri="{05A4C25C-085E-4340-85A3-A5531E510DB2}">
+      <thm15:themeFamily xmlns:thm15="http://schemas.microsoft.com/office/thememl/2012/main" name="Office Theme" id="{62F939B6-93AF-4DB8-9C6B-D6C7DFDC589F}" vid="{4A3C46E8-61CC-4603-A589-7422A47A8E4A}"/>
+    </a:ext>
+  </a:extLst>
+</a:theme>
+</file>
+
+<file path=ppt/theme/theme4.xml><?xml version="1.0" encoding="utf-8"?>
+<a:theme xmlns:a="http://schemas.openxmlformats.org/drawingml/2006/main" name="Office Theme">
+  <a:themeElements>
+    <a:clrScheme name="Office">
+      <a:dk1>
+        <a:sysClr val="windowText" lastClr="000000"/>
+      </a:dk1>
+      <a:lt1>
+        <a:sysClr val="window" lastClr="FFFFFF"/>
+      </a:lt1>
+      <a:dk2>
+        <a:srgbClr val="44546A"/>
+      </a:dk2>
+      <a:lt2>
+        <a:srgbClr val="E7E6E6"/>
+      </a:lt2>
+      <a:accent1>
+        <a:srgbClr val="4472C4"/>
+      </a:accent1>
+      <a:accent2>
+        <a:srgbClr val="ED7D31"/>
+      </a:accent2>
+      <a:accent3>
+        <a:srgbClr val="A5A5A5"/>
+      </a:accent3>
+      <a:accent4>
+        <a:srgbClr val="FFC000"/>
+      </a:accent4>
+      <a:accent5>
+        <a:srgbClr val="5B9BD5"/>
+      </a:accent5>
+      <a:accent6>
+        <a:srgbClr val="70AD47"/>
+      </a:accent6>
+      <a:hlink>
+        <a:srgbClr val="0563C1"/>
+      </a:hlink>
+      <a:folHlink>
+        <a:srgbClr val="954F72"/>
+      </a:folHlink>
+    </a:clrScheme>
+    <a:fontScheme name="Office">
+      <a:majorFont>
+        <a:latin typeface="Calibri Light" panose="020F0302020204030204"/>
+        <a:ea typeface=""/>
+        <a:cs typeface=""/>
+        <a:font script="Jpan" typeface="游ゴシック Light"/>
+        <a:font script="Hang" typeface="맑은 고딕"/>
+        <a:font script="Hans" typeface="等线 Light"/>
+        <a:font script="Hant" typeface="新細明體"/>
+        <a:font script="Arab" typeface="Times New Roman"/>
+        <a:font script="Hebr" typeface="Times New Roman"/>
+        <a:font script="Thai" typeface="Angsana New"/>
+        <a:font script="Ethi" typeface="Nyala"/>
+        <a:font script="Beng" typeface="Vrinda"/>
+        <a:font script="Gujr" typeface="Shruti"/>
+        <a:font script="Khmr" typeface="MoolBoran"/>
+        <a:font script="Knda" typeface="Tunga"/>
+        <a:font script="Guru" typeface="Raavi"/>
+        <a:font script="Cans" typeface="Euphemia"/>
+        <a:font script="Cher" typeface="Plantagenet Cherokee"/>
+        <a:font script="Yiii" typeface="Microsoft Yi Baiti"/>
+        <a:font script="Tibt" typeface="Microsoft Himalaya"/>
+        <a:font script="Thaa" typeface="MV Boli"/>
+        <a:font script="Deva" typeface="Mangal"/>
+        <a:font script="Telu" typeface="Gautami"/>
+        <a:font script="Taml" typeface="Latha"/>
+        <a:font script="Syrc" typeface="Estrangelo Edessa"/>
+        <a:font script="Orya" typeface="Kalinga"/>
+        <a:font script="Mlym" typeface="Kartika"/>
+        <a:font script="Laoo" typeface="DokChampa"/>
+        <a:font script="Sinh" typeface="Iskoola Pota"/>
+        <a:font script="Mong" typeface="Mongolian Baiti"/>
+        <a:font script="Viet" typeface="Times New Roman"/>
+        <a:font script="Uigh" typeface="Microsoft Uighur"/>
+        <a:font script="Geor" typeface="Sylfaen"/>
+        <a:font script="Armn" typeface="Arial"/>
+        <a:font script="Bugi" typeface="Leelawadee UI"/>
+        <a:font script="Bopo" typeface="Microsoft JhengHei"/>
+        <a:font script="Java" typeface="Javanese Text"/>
+        <a:font script="Lisu" typeface="Segoe UI"/>
+        <a:font script="Mymr" typeface="Myanmar Text"/>
+        <a:font script="Nkoo" typeface="Ebrima"/>
+        <a:font script="Olck" typeface="Nirmala UI"/>
+        <a:font script="Osma" typeface="Ebrima"/>
+        <a:font script="Phag" typeface="Phagspa"/>
+        <a:font script="Syrn" typeface="Estrangelo Edessa"/>
+        <a:font script="Syrj" typeface="Estrangelo Edessa"/>
+        <a:font script="Syre" typeface="Estrangelo Edessa"/>
+        <a:font script="Sora" typeface="Nirmala UI"/>
+        <a:font script="Tale" typeface="Microsoft Tai Le"/>
+        <a:font script="Talu" typeface="Microsoft New Tai Lue"/>
+        <a:font script="Tfng" typeface="Ebrima"/>
+      </a:majorFont>
+      <a:minorFont>
+        <a:latin typeface="Calibri" panose="020F0502020204030204"/>
+        <a:ea typeface=""/>
+        <a:cs typeface=""/>
+        <a:font script="Jpan" typeface="游ゴシック"/>
+        <a:font script="Hang" typeface="맑은 고딕"/>
+        <a:font script="Hans" typeface="等线"/>
+        <a:font script="Hant" typeface="新細明體"/>
+        <a:font script="Arab" typeface="Arial"/>
+        <a:font script="Hebr" typeface="Arial"/>
+        <a:font script="Thai" typeface="Cordia New"/>
+        <a:font script="Ethi" typeface="Nyala"/>
+        <a:font script="Beng" typeface="Vrinda"/>
+        <a:font script="Gujr" typeface="Shruti"/>
+        <a:font script="Khmr" typeface="DaunPenh"/>
+        <a:font script="Knda" typeface="Tunga"/>
+        <a:font script="Guru" typeface="Raavi"/>
+        <a:font script="Cans" typeface="Euphemia"/>
+        <a:font script="Cher" typeface="Plantagenet Cherokee"/>
+        <a:font script="Yiii" typeface="Microsoft Yi Baiti"/>
+        <a:font script="Tibt" typeface="Microsoft Himalaya"/>
+        <a:font script="Thaa" typeface="MV Boli"/>
+        <a:font script="Deva" typeface="Mangal"/>
+        <a:font script="Telu" typeface="Gautami"/>
+        <a:font script="Taml" typeface="Latha"/>
+        <a:font script="Syrc" typeface="Estrangelo Edessa"/>
+        <a:font script="Orya" typeface="Kalinga"/>
+        <a:font script="Mlym" typeface="Kartika"/>
+        <a:font script="Laoo" typeface="DokChampa"/>
+        <a:font script="Sinh" typeface="Iskoola Pota"/>
+        <a:font script="Mong" typeface="Mongolian Baiti"/>
+        <a:font script="Viet" typeface="Arial"/>
+        <a:font script="Uigh" typeface="Microsoft Uighur"/>
+        <a:font script="Geor" typeface="Sylfaen"/>
+        <a:font script="Armn" typeface="Arial"/>
+        <a:font script="Bugi" typeface="Leelawadee UI"/>
+        <a:font script="Bopo" typeface="Microsoft JhengHei"/>
+        <a:font script="Java" typeface="Javanese Text"/>
+        <a:font script="Lisu" typeface="Segoe UI"/>
+        <a:font script="Mymr" typeface="Myanmar Text"/>
+        <a:font script="Nkoo" typeface="Ebrima"/>
+        <a:font script="Olck" typeface="Nirmala UI"/>
+        <a:font script="Osma" typeface="Ebrima"/>
+        <a:font script="Phag" typeface="Phagspa"/>
+        <a:font script="Syrn" typeface="Estrangelo Edessa"/>
+        <a:font script="Syrj" typeface="Estrangelo Edessa"/>
+        <a:font script="Syre" typeface="Estrangelo Edessa"/>
+        <a:font script="Sora" typeface="Nirmala UI"/>
+        <a:font script="Tale" typeface="Microsoft Tai Le"/>
+        <a:font script="Talu" typeface="Microsoft New Tai Lue"/>
+        <a:font script="Tfng" typeface="Ebrima"/>
+      </a:minorFont>
+    </a:fontScheme>
+    <a:fmtScheme name="Office">
+      <a:fillStyleLst>
+        <a:solidFill>
+          <a:schemeClr val="phClr"/>
+        </a:solidFill>
+        <a:gradFill rotWithShape="1">
+          <a:gsLst>
+            <a:gs pos="0">
+              <a:schemeClr val="phClr">
+                <a:lumMod val="110000"/>
+                <a:satMod val="105000"/>
+                <a:tint val="67000"/>
+              </a:schemeClr>
+            </a:gs>
+            <a:gs pos="50000">
+              <a:schemeClr val="phClr">
+                <a:lumMod val="105000"/>
+                <a:satMod val="103000"/>
+                <a:tint val="73000"/>
+              </a:schemeClr>
+            </a:gs>
+            <a:gs pos="100000">
+              <a:schemeClr val="phClr">
+                <a:lumMod val="105000"/>
+                <a:satMod val="109000"/>
+                <a:tint val="81000"/>
+              </a:schemeClr>
+            </a:gs>
+          </a:gsLst>
+          <a:lin ang="5400000" scaled="0"/>
+        </a:gradFill>
+        <a:gradFill rotWithShape="1">
+          <a:gsLst>
+            <a:gs pos="0">
+              <a:schemeClr val="phClr">
+                <a:satMod val="103000"/>
+                <a:lumMod val="102000"/>
+                <a:tint val="94000"/>
+              </a:schemeClr>
+            </a:gs>
+            <a:gs pos="50000">
+              <a:schemeClr val="phClr">
+                <a:satMod val="110000"/>
+                <a:lumMod val="100000"/>
+                <a:shade val="100000"/>
+              </a:schemeClr>
+            </a:gs>
+            <a:gs pos="100000">
+              <a:schemeClr val="phClr">
+                <a:lumMod val="99000"/>
+                <a:satMod val="120000"/>
+                <a:shade val="78000"/>
+              </a:schemeClr>
+            </a:gs>
+          </a:gsLst>
+          <a:lin ang="5400000" scaled="0"/>
+        </a:gradFill>
+      </a:fillStyleLst>
+      <a:lnStyleLst>
+        <a:ln w="6350" cap="flat" cmpd="sng" algn="ctr">
+          <a:solidFill>
+            <a:schemeClr val="phClr"/>
+          </a:solidFill>
+          <a:prstDash val="solid"/>
+          <a:miter lim="800000"/>
+        </a:ln>
+        <a:ln w="12700" cap="flat" cmpd="sng" algn="ctr">
+          <a:solidFill>
+            <a:schemeClr val="phClr"/>
+          </a:solidFill>
+          <a:prstDash val="solid"/>
+          <a:miter lim="800000"/>
+        </a:ln>
+        <a:ln w="19050" cap="flat" cmpd="sng" algn="ctr">
+          <a:solidFill>
+            <a:schemeClr val="phClr"/>
+          </a:solidFill>
+          <a:prstDash val="solid"/>
+          <a:miter lim="800000"/>
+        </a:ln>
+      </a:lnStyleLst>
+      <a:effectStyleLst>
+        <a:effectStyle>
+          <a:effectLst/>
+        </a:effectStyle>
+        <a:effectStyle>
+          <a:effectLst/>
+        </a:effectStyle>
+        <a:effectStyle>
+          <a:effectLst>
+            <a:outerShdw blurRad="57150" dist="19050" dir="5400000" algn="ctr" rotWithShape="0">
+              <a:srgbClr val="000000">
+                <a:alpha val="63000"/>
+              </a:srgbClr>
+            </a:outerShdw>
+          </a:effectLst>
+        </a:effectStyle>
+      </a:effectStyleLst>
+      <a:bgFillStyleLst>
+        <a:solidFill>
+          <a:schemeClr val="phClr"/>
+        </a:solidFill>
+        <a:solidFill>
+          <a:schemeClr val="phClr">
+            <a:tint val="95000"/>
+            <a:satMod val="170000"/>
+          </a:schemeClr>
+        </a:solidFill>
+        <a:gradFill rotWithShape="1">
+          <a:gsLst>
+            <a:gs pos="0">
+              <a:schemeClr val="phClr">
+                <a:tint val="93000"/>
+                <a:satMod val="150000"/>
+                <a:shade val="98000"/>
+                <a:lumMod val="102000"/>
+              </a:schemeClr>
+            </a:gs>
+            <a:gs pos="50000">
+              <a:schemeClr val="phClr">
+                <a:tint val="98000"/>
+                <a:satMod val="130000"/>
+                <a:shade val="90000"/>
+                <a:lumMod val="103000"/>
+              </a:schemeClr>
+            </a:gs>
+            <a:gs pos="100000">
+              <a:schemeClr val="phClr">
+                <a:shade val="63000"/>
+                <a:satMod val="120000"/>
+              </a:schemeClr>
+            </a:gs>
+          </a:gsLst>
+          <a:lin ang="5400000" scaled="0"/>
+        </a:gradFill>
+      </a:bgFillStyleLst>
+    </a:fmtScheme>
+  </a:themeElements>
+  <a:objectDefaults/>
+  <a:extraClrSchemeLst/>
+  <a:extLst>
+    <a:ext uri="{05A4C25C-085E-4340-85A3-A5531E510DB2}">
+      <thm15:themeFamily xmlns:thm15="http://schemas.microsoft.com/office/thememl/2012/main" name="Office Theme" id="{62F939B6-93AF-4DB8-9C6B-D6C7DFDC589F}" vid="{4A3C46E8-61CC-4603-A589-7422A47A8E4A}"/>
+    </a:ext>
+  </a:extLst>
+</a:theme>
 </file>
</xml_diff>

<commit_message>
cleaned up powerpoint, should be ready for submission
</commit_message>
<xml_diff>
--- a/Open Table Presentation.pptx
+++ b/Open Table Presentation.pptx
@@ -8072,7 +8072,7 @@
           <a:p>
             <a:r>
               <a:rPr lang="en-US" sz="4400" dirty="0"/>
-              <a:t>Future Work</a:t>
+              <a:t>Takeaways &amp; future work</a:t>
             </a:r>
           </a:p>
         </p:txBody>
@@ -8093,12 +8093,343 @@
             <p:ph idx="1"/>
           </p:nvPr>
         </p:nvSpPr>
-        <p:spPr/>
-        <p:txBody>
-          <a:bodyPr/>
-          <a:lstStyle/>
-          <a:p>
-            <a:endParaRPr lang="en-US" dirty="0"/>
+        <p:spPr>
+          <a:xfrm>
+            <a:off x="1451579" y="2015733"/>
+            <a:ext cx="9603275" cy="1749444"/>
+          </a:xfrm>
+        </p:spPr>
+        <p:txBody>
+          <a:bodyPr>
+            <a:normAutofit/>
+          </a:bodyPr>
+          <a:lstStyle/>
+          <a:p>
+            <a:r>
+              <a:rPr lang="en-US" sz="2800" dirty="0"/>
+              <a:t>Restaurant data:</a:t>
+            </a:r>
+            <a:endParaRPr lang="en-US" sz="2600" dirty="0"/>
+          </a:p>
+          <a:p>
+            <a:pPr lvl="1"/>
+            <a:r>
+              <a:rPr lang="en-US" sz="2400" dirty="0"/>
+              <a:t>Can affect other industries (shopping, real estate, etc.)</a:t>
+            </a:r>
+          </a:p>
+          <a:p>
+            <a:pPr lvl="1"/>
+            <a:r>
+              <a:rPr lang="en-US" sz="2400" dirty="0"/>
+              <a:t>Can show signs of opportunity (Hudson Yards)</a:t>
+            </a:r>
+          </a:p>
+          <a:p>
+            <a:pPr marL="457200" lvl="1" indent="0">
+              <a:buNone/>
+            </a:pPr>
+            <a:endParaRPr lang="en-US" sz="2400" dirty="0"/>
+          </a:p>
+          <a:p>
+            <a:pPr marL="457200" lvl="1" indent="0">
+              <a:buNone/>
+            </a:pPr>
+            <a:endParaRPr lang="en-US" sz="2400" dirty="0"/>
+          </a:p>
+          <a:p>
+            <a:pPr marL="457200" lvl="1" indent="0">
+              <a:buNone/>
+            </a:pPr>
+            <a:endParaRPr lang="en-US" sz="2000" dirty="0"/>
+          </a:p>
+        </p:txBody>
+      </p:sp>
+      <p:sp>
+        <p:nvSpPr>
+          <p:cNvPr id="5" name="Content Placeholder 2">
+            <a:extLst>
+              <a:ext uri="{FF2B5EF4-FFF2-40B4-BE49-F238E27FC236}">
+                <a16:creationId xmlns:a16="http://schemas.microsoft.com/office/drawing/2014/main" id="{04C1E4A8-8501-B14F-A56A-2F59C2C93432}"/>
+              </a:ext>
+            </a:extLst>
+          </p:cNvPr>
+          <p:cNvSpPr txBox="1">
+            <a:spLocks/>
+          </p:cNvSpPr>
+          <p:nvPr/>
+        </p:nvSpPr>
+        <p:spPr>
+          <a:xfrm>
+            <a:off x="1451579" y="3765177"/>
+            <a:ext cx="9603275" cy="1749444"/>
+          </a:xfrm>
+          <a:prstGeom prst="rect">
+            <a:avLst/>
+          </a:prstGeom>
+        </p:spPr>
+        <p:txBody>
+          <a:bodyPr vert="horz" lIns="91440" tIns="45720" rIns="91440" bIns="45720" rtlCol="0" anchor="t">
+            <a:normAutofit/>
+          </a:bodyPr>
+          <a:lstStyle>
+            <a:lvl1pPr marL="228600" indent="-228600" algn="l" defTabSz="914400" rtl="0" eaLnBrk="1" latinLnBrk="0" hangingPunct="1">
+              <a:lnSpc>
+                <a:spcPct val="120000"/>
+              </a:lnSpc>
+              <a:spcBef>
+                <a:spcPts val="1000"/>
+              </a:spcBef>
+              <a:buClr>
+                <a:schemeClr val="accent1"/>
+              </a:buClr>
+              <a:buSzPct val="100000"/>
+              <a:buFont typeface="Arial" panose="020B0604020202020204" pitchFamily="34" charset="0"/>
+              <a:buChar char="•"/>
+              <a:defRPr sz="2000" kern="1200">
+                <a:solidFill>
+                  <a:schemeClr val="tx1"/>
+                </a:solidFill>
+                <a:effectLst/>
+                <a:latin typeface="+mn-lt"/>
+                <a:ea typeface="+mn-ea"/>
+                <a:cs typeface="+mn-cs"/>
+              </a:defRPr>
+            </a:lvl1pPr>
+            <a:lvl2pPr marL="685800" indent="-228600" algn="l" defTabSz="914400" rtl="0" eaLnBrk="1" latinLnBrk="0" hangingPunct="1">
+              <a:lnSpc>
+                <a:spcPct val="120000"/>
+              </a:lnSpc>
+              <a:spcBef>
+                <a:spcPts val="500"/>
+              </a:spcBef>
+              <a:buClr>
+                <a:schemeClr val="accent1"/>
+              </a:buClr>
+              <a:buSzPct val="100000"/>
+              <a:buFont typeface="Arial" panose="020B0604020202020204" pitchFamily="34" charset="0"/>
+              <a:buChar char="•"/>
+              <a:defRPr sz="1800" kern="1200" cap="none" baseline="0">
+                <a:solidFill>
+                  <a:schemeClr val="tx1"/>
+                </a:solidFill>
+                <a:effectLst/>
+                <a:latin typeface="+mn-lt"/>
+                <a:ea typeface="+mn-ea"/>
+                <a:cs typeface="+mn-cs"/>
+              </a:defRPr>
+            </a:lvl2pPr>
+            <a:lvl3pPr marL="1143000" indent="-228600" algn="l" defTabSz="914400" rtl="0" eaLnBrk="1" latinLnBrk="0" hangingPunct="1">
+              <a:lnSpc>
+                <a:spcPct val="120000"/>
+              </a:lnSpc>
+              <a:spcBef>
+                <a:spcPts val="500"/>
+              </a:spcBef>
+              <a:buClr>
+                <a:schemeClr val="accent1"/>
+              </a:buClr>
+              <a:buSzPct val="100000"/>
+              <a:buFont typeface="Arial" panose="020B0604020202020204" pitchFamily="34" charset="0"/>
+              <a:buChar char="•"/>
+              <a:defRPr sz="1600" kern="1200">
+                <a:solidFill>
+                  <a:schemeClr val="tx1"/>
+                </a:solidFill>
+                <a:effectLst/>
+                <a:latin typeface="+mn-lt"/>
+                <a:ea typeface="+mn-ea"/>
+                <a:cs typeface="+mn-cs"/>
+              </a:defRPr>
+            </a:lvl3pPr>
+            <a:lvl4pPr marL="1600200" indent="-228600" algn="l" defTabSz="914400" rtl="0" eaLnBrk="1" latinLnBrk="0" hangingPunct="1">
+              <a:lnSpc>
+                <a:spcPct val="120000"/>
+              </a:lnSpc>
+              <a:spcBef>
+                <a:spcPts val="500"/>
+              </a:spcBef>
+              <a:buClr>
+                <a:schemeClr val="accent1"/>
+              </a:buClr>
+              <a:buSzPct val="100000"/>
+              <a:buFont typeface="Arial" panose="020B0604020202020204" pitchFamily="34" charset="0"/>
+              <a:buChar char="•"/>
+              <a:defRPr sz="1400" kern="1200" cap="none" baseline="0">
+                <a:solidFill>
+                  <a:schemeClr val="tx1"/>
+                </a:solidFill>
+                <a:effectLst/>
+                <a:latin typeface="+mn-lt"/>
+                <a:ea typeface="+mn-ea"/>
+                <a:cs typeface="+mn-cs"/>
+              </a:defRPr>
+            </a:lvl4pPr>
+            <a:lvl5pPr marL="2057400" indent="-228600" algn="l" defTabSz="914400" rtl="0" eaLnBrk="1" latinLnBrk="0" hangingPunct="1">
+              <a:lnSpc>
+                <a:spcPct val="120000"/>
+              </a:lnSpc>
+              <a:spcBef>
+                <a:spcPts val="500"/>
+              </a:spcBef>
+              <a:buClr>
+                <a:schemeClr val="accent1"/>
+              </a:buClr>
+              <a:buSzPct val="100000"/>
+              <a:buFont typeface="Arial" panose="020B0604020202020204" pitchFamily="34" charset="0"/>
+              <a:buChar char="•"/>
+              <a:defRPr sz="1200" kern="1200">
+                <a:solidFill>
+                  <a:schemeClr val="tx1"/>
+                </a:solidFill>
+                <a:effectLst/>
+                <a:latin typeface="+mn-lt"/>
+                <a:ea typeface="+mn-ea"/>
+                <a:cs typeface="+mn-cs"/>
+              </a:defRPr>
+            </a:lvl5pPr>
+            <a:lvl6pPr marL="2514600" indent="-228600" algn="l" defTabSz="914400" rtl="0" eaLnBrk="1" latinLnBrk="0" hangingPunct="1">
+              <a:lnSpc>
+                <a:spcPct val="120000"/>
+              </a:lnSpc>
+              <a:spcBef>
+                <a:spcPts val="500"/>
+              </a:spcBef>
+              <a:buClr>
+                <a:schemeClr val="accent1"/>
+              </a:buClr>
+              <a:buSzPct val="100000"/>
+              <a:buFont typeface="Arial" panose="020B0604020202020204" pitchFamily="34" charset="0"/>
+              <a:buChar char="•"/>
+              <a:defRPr sz="1200" kern="1200">
+                <a:solidFill>
+                  <a:schemeClr val="tx1"/>
+                </a:solidFill>
+                <a:effectLst/>
+                <a:latin typeface="+mn-lt"/>
+                <a:ea typeface="+mn-ea"/>
+                <a:cs typeface="+mn-cs"/>
+              </a:defRPr>
+            </a:lvl6pPr>
+            <a:lvl7pPr marL="2971800" indent="-228600" algn="l" defTabSz="914400" rtl="0" eaLnBrk="1" latinLnBrk="0" hangingPunct="1">
+              <a:lnSpc>
+                <a:spcPct val="120000"/>
+              </a:lnSpc>
+              <a:spcBef>
+                <a:spcPts val="500"/>
+              </a:spcBef>
+              <a:buClr>
+                <a:schemeClr val="accent1"/>
+              </a:buClr>
+              <a:buSzPct val="100000"/>
+              <a:buFont typeface="Arial" panose="020B0604020202020204" pitchFamily="34" charset="0"/>
+              <a:buChar char="•"/>
+              <a:defRPr sz="1200" kern="1200">
+                <a:solidFill>
+                  <a:schemeClr val="tx1"/>
+                </a:solidFill>
+                <a:effectLst/>
+                <a:latin typeface="+mn-lt"/>
+                <a:ea typeface="+mn-ea"/>
+                <a:cs typeface="+mn-cs"/>
+              </a:defRPr>
+            </a:lvl7pPr>
+            <a:lvl8pPr marL="3429000" indent="-228600" algn="l" defTabSz="914400" rtl="0" eaLnBrk="1" latinLnBrk="0" hangingPunct="1">
+              <a:lnSpc>
+                <a:spcPct val="120000"/>
+              </a:lnSpc>
+              <a:spcBef>
+                <a:spcPts val="500"/>
+              </a:spcBef>
+              <a:buClr>
+                <a:schemeClr val="accent1"/>
+              </a:buClr>
+              <a:buSzPct val="100000"/>
+              <a:buFont typeface="Arial" panose="020B0604020202020204" pitchFamily="34" charset="0"/>
+              <a:buChar char="•"/>
+              <a:defRPr sz="1200" kern="1200" baseline="0">
+                <a:solidFill>
+                  <a:schemeClr val="tx1"/>
+                </a:solidFill>
+                <a:effectLst/>
+                <a:latin typeface="+mn-lt"/>
+                <a:ea typeface="+mn-ea"/>
+                <a:cs typeface="+mn-cs"/>
+              </a:defRPr>
+            </a:lvl8pPr>
+            <a:lvl9pPr marL="3886200" indent="-228600" algn="l" defTabSz="914400" rtl="0" eaLnBrk="1" latinLnBrk="0" hangingPunct="1">
+              <a:lnSpc>
+                <a:spcPct val="120000"/>
+              </a:lnSpc>
+              <a:spcBef>
+                <a:spcPts val="500"/>
+              </a:spcBef>
+              <a:buClr>
+                <a:schemeClr val="accent1"/>
+              </a:buClr>
+              <a:buSzPct val="100000"/>
+              <a:buFont typeface="Arial" panose="020B0604020202020204" pitchFamily="34" charset="0"/>
+              <a:buChar char="•"/>
+              <a:defRPr sz="1200" kern="1200" baseline="0">
+                <a:solidFill>
+                  <a:schemeClr val="tx1"/>
+                </a:solidFill>
+                <a:effectLst/>
+                <a:latin typeface="+mn-lt"/>
+                <a:ea typeface="+mn-ea"/>
+                <a:cs typeface="+mn-cs"/>
+              </a:defRPr>
+            </a:lvl9pPr>
+          </a:lstStyle>
+          <a:p>
+            <a:r>
+              <a:rPr lang="en-US" sz="2800" dirty="0"/>
+              <a:t>Future Work:</a:t>
+            </a:r>
+            <a:endParaRPr lang="en-US" sz="2600" dirty="0"/>
+          </a:p>
+          <a:p>
+            <a:pPr lvl="1"/>
+            <a:r>
+              <a:rPr lang="en-US" sz="2400" dirty="0"/>
+              <a:t>Correlation between Real Estate and Food</a:t>
+            </a:r>
+          </a:p>
+          <a:p>
+            <a:pPr lvl="1"/>
+            <a:r>
+              <a:rPr lang="en-US" sz="2400" dirty="0"/>
+              <a:t>Cuisine Analysis</a:t>
+            </a:r>
+          </a:p>
+          <a:p>
+            <a:pPr lvl="1"/>
+            <a:endParaRPr lang="en-US" sz="2400" dirty="0"/>
+          </a:p>
+          <a:p>
+            <a:pPr lvl="1"/>
+            <a:endParaRPr lang="en-US" sz="2400" dirty="0"/>
+          </a:p>
+          <a:p>
+            <a:pPr marL="457200" lvl="1" indent="0">
+              <a:buFont typeface="Arial" panose="020B0604020202020204" pitchFamily="34" charset="0"/>
+              <a:buNone/>
+            </a:pPr>
+            <a:endParaRPr lang="en-US" sz="2400" dirty="0"/>
+          </a:p>
+          <a:p>
+            <a:pPr marL="457200" lvl="1" indent="0">
+              <a:buFont typeface="Arial" panose="020B0604020202020204" pitchFamily="34" charset="0"/>
+              <a:buNone/>
+            </a:pPr>
+            <a:endParaRPr lang="en-US" sz="2400" dirty="0"/>
+          </a:p>
+          <a:p>
+            <a:pPr marL="457200" lvl="1" indent="0">
+              <a:buFont typeface="Arial" panose="020B0604020202020204" pitchFamily="34" charset="0"/>
+              <a:buNone/>
+            </a:pPr>
+            <a:endParaRPr lang="en-US" sz="2000" dirty="0"/>
           </a:p>
         </p:txBody>
       </p:sp>
@@ -8366,43 +8697,37 @@
           <a:lstStyle/>
           <a:p>
             <a:r>
-              <a:rPr lang="en-US" dirty="0"/>
+              <a:rPr lang="en-US" sz="2400" dirty="0"/>
               <a:t>What is OpenTable?</a:t>
             </a:r>
           </a:p>
           <a:p>
             <a:r>
-              <a:rPr lang="en-US" dirty="0"/>
+              <a:rPr lang="en-US" sz="2400" dirty="0"/>
               <a:t>Why do we care?</a:t>
             </a:r>
           </a:p>
           <a:p>
             <a:r>
-              <a:rPr lang="en-US" dirty="0"/>
+              <a:rPr lang="en-US" sz="2400" dirty="0"/>
               <a:t>Scraped Data</a:t>
             </a:r>
           </a:p>
           <a:p>
             <a:r>
-              <a:rPr lang="en-US" dirty="0"/>
+              <a:rPr lang="en-US" sz="2400" dirty="0"/>
               <a:t>Analysis</a:t>
             </a:r>
           </a:p>
           <a:p>
             <a:r>
-              <a:rPr lang="en-US" dirty="0"/>
-              <a:t>Findings</a:t>
-            </a:r>
-          </a:p>
-          <a:p>
-            <a:r>
-              <a:rPr lang="en-US" dirty="0"/>
-              <a:t>Future Work</a:t>
-            </a:r>
-          </a:p>
-          <a:p>
-            <a:r>
-              <a:rPr lang="en-US" dirty="0"/>
+              <a:rPr lang="en-US" sz="2400" dirty="0"/>
+              <a:t>Takeaways &amp; Future Work</a:t>
+            </a:r>
+          </a:p>
+          <a:p>
+            <a:r>
+              <a:rPr lang="en-US" sz="2400" dirty="0"/>
               <a:t>Questions</a:t>
             </a:r>
           </a:p>
@@ -8510,7 +8835,7 @@
           <a:p>
             <a:r>
               <a:rPr lang="en-US" sz="2400" dirty="0"/>
-              <a:t>Valued at 2.6 billion in 2014</a:t>
+              <a:t>Valued at $2.6 billion in 2014</a:t>
             </a:r>
           </a:p>
           <a:p>
@@ -8998,10 +9323,10 @@
       </p:grpSpPr>
       <p:pic>
         <p:nvPicPr>
-          <p:cNvPr id="5" name="Picture 4">
+          <p:cNvPr id="7" name="Picture 6">
             <a:extLst>
               <a:ext uri="{FF2B5EF4-FFF2-40B4-BE49-F238E27FC236}">
-                <a16:creationId xmlns:a16="http://schemas.microsoft.com/office/drawing/2014/main" id="{8A4C349D-413D-C244-B14A-B16D71884406}"/>
+                <a16:creationId xmlns:a16="http://schemas.microsoft.com/office/drawing/2014/main" id="{D6F931C0-C986-C744-97B7-91EC8057F0BC}"/>
               </a:ext>
             </a:extLst>
           </p:cNvPr>
@@ -9018,8 +9343,8 @@
         </p:blipFill>
         <p:spPr>
           <a:xfrm>
-            <a:off x="1284194" y="173912"/>
-            <a:ext cx="9623611" cy="5774166"/>
+            <a:off x="356347" y="125506"/>
+            <a:ext cx="11479306" cy="5739653"/>
           </a:xfrm>
           <a:prstGeom prst="rect">
             <a:avLst/>

</xml_diff>